<commit_message>
add changes to reflect Nicole's comments
ref #11
</commit_message>
<xml_diff>
--- a/docs/2019 05 10 presentation/2019 05 10 overview.pptx
+++ b/docs/2019 05 10 presentation/2019 05 10 overview.pptx
@@ -223,7 +223,7 @@
           <a:p>
             <a:fld id="{CB499594-5908-194F-A8D4-32B5BC28CDDF}" type="datetimeFigureOut">
               <a:rPr lang="en-US" smtClean="0"/>
-              <a:t>5/7/19</a:t>
+              <a:t>5/9/19</a:t>
             </a:fld>
             <a:endParaRPr lang="en-US"/>
           </a:p>
@@ -751,16 +751,15 @@
             </a:r>
             <a:r>
               <a:rPr lang="en-US" baseline="0" dirty="0"/>
-              <a:t> overview</a:t>
+              <a:t> overview — Eric Scace </a:t>
             </a:r>
             <a:r>
               <a:rPr lang="en-US" dirty="0"/>
               <a:t>– </a:t>
             </a:r>
-            <a:fld id="{6FEB6C36-DF11-2648-923A-DC90E06EB128}" type="datetime8">
+            <a:fld id="{A8CF89D8-95B5-F942-92F2-D9D00BC00785}" type="datetime1">
               <a:rPr lang="en-US" smtClean="0"/>
-              <a:pPr/>
-              <a:t>5/7/19 12:36 PM</a:t>
+              <a:t>5/9/19</a:t>
             </a:fld>
             <a:endParaRPr lang="en-US" dirty="0"/>
           </a:p>
@@ -4677,7 +4676,7 @@
             <p:ph type="tbl" sz="quarter" idx="10"/>
             <p:extLst>
               <p:ext uri="{D42A27DB-BD31-4B8C-83A1-F6EECF244321}">
-                <p14:modId xmlns:p14="http://schemas.microsoft.com/office/powerpoint/2010/main" val="968356562"/>
+                <p14:modId xmlns:p14="http://schemas.microsoft.com/office/powerpoint/2010/main" val="1026043994"/>
               </p:ext>
             </p:extLst>
           </p:nvPr>
@@ -5169,7 +5168,7 @@
                           <a:latin typeface="PFDinTextPro-Regular"/>
                           <a:cs typeface="PFDinTextPro-Regular"/>
                         </a:rPr>
-                        <a:t>full Berklee data set (large, well-researched)</a:t>
+                        <a:t>subset of Berklee data (large, well-researched)</a:t>
                       </a:r>
                     </a:p>
                     <a:p>
@@ -5589,14 +5588,14 @@
             <p:ph type="tbl" sz="quarter" idx="10"/>
             <p:extLst>
               <p:ext uri="{D42A27DB-BD31-4B8C-83A1-F6EECF244321}">
-                <p14:modId xmlns:p14="http://schemas.microsoft.com/office/powerpoint/2010/main" val="1538891768"/>
+                <p14:modId xmlns:p14="http://schemas.microsoft.com/office/powerpoint/2010/main" val="3948213841"/>
               </p:ext>
             </p:extLst>
           </p:nvPr>
         </p:nvGraphicFramePr>
         <p:xfrm>
           <a:off x="1" y="914400"/>
-          <a:ext cx="9143999" cy="6412992"/>
+          <a:ext cx="9143999" cy="6793992"/>
         </p:xfrm>
         <a:graphic>
           <a:graphicData uri="http://schemas.openxmlformats.org/drawingml/2006/table">
@@ -5626,7 +5625,7 @@
                     <a:bodyPr/>
                     <a:lstStyle/>
                     <a:p>
-                      <a:pPr algn="r">
+                      <a:pPr algn="l">
                         <a:lnSpc>
                           <a:spcPts val="3000"/>
                         </a:lnSpc>
@@ -5730,7 +5729,7 @@
                     <a:bodyPr/>
                     <a:lstStyle/>
                     <a:p>
-                      <a:pPr algn="r">
+                      <a:pPr algn="l">
                         <a:lnSpc>
                           <a:spcPts val="3000"/>
                         </a:lnSpc>
@@ -5745,7 +5744,7 @@
                           <a:latin typeface="PFDinTextPro-Regular"/>
                           <a:cs typeface="PFDinTextPro-Regular"/>
                         </a:rPr>
-                        <a:t>increase repos</a:t>
+                        <a:t>increase number of repos</a:t>
                       </a:r>
                     </a:p>
                   </a:txBody>
@@ -5854,7 +5853,7 @@
                     <a:bodyPr/>
                     <a:lstStyle/>
                     <a:p>
-                      <a:pPr algn="r">
+                      <a:pPr algn="l">
                         <a:lnSpc>
                           <a:spcPts val="3000"/>
                         </a:lnSpc>
@@ -5869,7 +5868,7 @@
                           <a:latin typeface="PFDinTextPro-Regular"/>
                           <a:cs typeface="PFDinTextPro-Regular"/>
                         </a:rPr>
-                        <a:t>expand scope</a:t>
+                        <a:t>expand data scope</a:t>
                       </a:r>
                     </a:p>
                   </a:txBody>
@@ -6058,13 +6057,13 @@
                     <a:bodyPr/>
                     <a:lstStyle/>
                     <a:p>
-                      <a:pPr algn="r">
-                        <a:lnSpc>
-                          <a:spcPts val="3000"/>
-                        </a:lnSpc>
-                      </a:pPr>
-                      <a:r>
-                        <a:rPr lang="en-US" sz="2400" b="0" i="0" dirty="0">
+                      <a:pPr algn="l">
+                        <a:lnSpc>
+                          <a:spcPts val="3000"/>
+                        </a:lnSpc>
+                      </a:pPr>
+                      <a:r>
+                        <a:rPr lang="en-US" sz="2400" b="0" i="0">
                           <a:solidFill>
                             <a:schemeClr val="bg1">
                               <a:lumMod val="50000"/>
@@ -6073,7 +6072,7 @@
                           <a:latin typeface="PFDinTextPro-Regular"/>
                           <a:cs typeface="PFDinTextPro-Regular"/>
                         </a:rPr>
-                        <a:t>expanded</a:t>
+                        <a:t>expand</a:t>
                       </a:r>
                       <a:br>
                         <a:rPr lang="en-US" sz="2400" b="0" i="0" dirty="0">
@@ -8807,14 +8806,14 @@
             <p:ph type="tbl" sz="quarter" idx="10"/>
             <p:extLst>
               <p:ext uri="{D42A27DB-BD31-4B8C-83A1-F6EECF244321}">
-                <p14:modId xmlns:p14="http://schemas.microsoft.com/office/powerpoint/2010/main" val="4201086381"/>
+                <p14:modId xmlns:p14="http://schemas.microsoft.com/office/powerpoint/2010/main" val="3715244221"/>
               </p:ext>
             </p:extLst>
           </p:nvPr>
         </p:nvGraphicFramePr>
         <p:xfrm>
           <a:off x="1" y="914400"/>
-          <a:ext cx="9143999" cy="5476494"/>
+          <a:ext cx="9143999" cy="4627245"/>
         </p:xfrm>
         <a:graphic>
           <a:graphicData uri="http://schemas.openxmlformats.org/drawingml/2006/table">
@@ -9002,14 +9001,14 @@
                       <a:r>
                         <a:rPr lang="en-US" sz="2400" b="0" i="0" baseline="0" dirty="0">
                           <a:solidFill>
-                            <a:schemeClr val="tx1"/>
-                          </a:solidFill>
-                          <a:latin typeface="PFDinTextPro-Regular"/>
-                          <a:cs typeface="PFDinTextPro-Regular"/>
-                        </a:rPr>
-                        <a:t>Multiple types of rights:</a:t>
-                      </a:r>
-                      <a:br>
+                            <a:srgbClr val="0000FF"/>
+                          </a:solidFill>
+                          <a:latin typeface="PFDinTextPro-Regular"/>
+                          <a:cs typeface="PFDinTextPro-Regular"/>
+                        </a:rPr>
+                        <a:t>Rights</a:t>
+                      </a:r>
+                      <a:r>
                         <a:rPr lang="en-US" sz="2400" b="0" i="0" baseline="0" dirty="0">
                           <a:solidFill>
                             <a:schemeClr val="tx1"/>
@@ -9017,73 +9016,7 @@
                           <a:latin typeface="PFDinTextPro-Regular"/>
                           <a:cs typeface="PFDinTextPro-Regular"/>
                         </a:rPr>
-                      </a:br>
-                      <a:r>
-                        <a:rPr lang="en-US" sz="2400" b="0" i="0" baseline="0" dirty="0">
-                          <a:solidFill>
-                            <a:schemeClr val="tx1"/>
-                          </a:solidFill>
-                          <a:latin typeface="PFDinTextPro-Regular"/>
-                          <a:cs typeface="PFDinTextPro-Regular"/>
-                        </a:rPr>
-                        <a:t>– publishing</a:t>
-                      </a:r>
-                      <a:br>
-                        <a:rPr lang="en-US" sz="2400" b="0" i="0" baseline="0" dirty="0">
-                          <a:solidFill>
-                            <a:schemeClr val="tx1"/>
-                          </a:solidFill>
-                          <a:latin typeface="PFDinTextPro-Regular"/>
-                          <a:cs typeface="PFDinTextPro-Regular"/>
-                        </a:rPr>
-                      </a:br>
-                      <a:r>
-                        <a:rPr lang="en-US" sz="2400" b="0" i="0" baseline="0" dirty="0">
-                          <a:solidFill>
-                            <a:schemeClr val="tx1"/>
-                          </a:solidFill>
-                          <a:latin typeface="PFDinTextPro-Regular"/>
-                          <a:cs typeface="PFDinTextPro-Regular"/>
-                        </a:rPr>
-                        <a:t>– performance</a:t>
-                      </a:r>
-                      <a:br>
-                        <a:rPr lang="en-US" sz="2400" b="0" i="0" baseline="0" dirty="0">
-                          <a:solidFill>
-                            <a:schemeClr val="tx1"/>
-                          </a:solidFill>
-                          <a:latin typeface="PFDinTextPro-Regular"/>
-                          <a:cs typeface="PFDinTextPro-Regular"/>
-                        </a:rPr>
-                      </a:br>
-                      <a:r>
-                        <a:rPr lang="en-US" sz="2400" b="0" i="0" baseline="0" dirty="0">
-                          <a:solidFill>
-                            <a:schemeClr val="tx1"/>
-                          </a:solidFill>
-                          <a:latin typeface="PFDinTextPro-Regular"/>
-                          <a:cs typeface="PFDinTextPro-Regular"/>
-                        </a:rPr>
-                        <a:t>– mechanical</a:t>
-                      </a:r>
-                      <a:br>
-                        <a:rPr lang="en-US" sz="2400" b="0" i="0" baseline="0" dirty="0">
-                          <a:solidFill>
-                            <a:schemeClr val="tx1"/>
-                          </a:solidFill>
-                          <a:latin typeface="PFDinTextPro-Regular"/>
-                          <a:cs typeface="PFDinTextPro-Regular"/>
-                        </a:rPr>
-                      </a:br>
-                      <a:r>
-                        <a:rPr lang="en-US" sz="2400" b="0" i="0" baseline="0" dirty="0">
-                          <a:solidFill>
-                            <a:schemeClr val="tx1"/>
-                          </a:solidFill>
-                          <a:latin typeface="PFDinTextPro-Regular"/>
-                          <a:cs typeface="PFDinTextPro-Regular"/>
-                        </a:rPr>
-                        <a:t>– synchronization, derivative…</a:t>
+                        <a:t>: publishing, performance, recording, synchronization, derivative…</a:t>
                       </a:r>
                     </a:p>
                   </a:txBody>
@@ -9188,12 +9121,22 @@
                       <a:r>
                         <a:rPr lang="en-US" sz="2400" b="0" i="0" baseline="0" dirty="0">
                           <a:solidFill>
-                            <a:schemeClr val="tx1"/>
-                          </a:solidFill>
-                          <a:latin typeface="PFDinTextPro-Regular"/>
-                          <a:cs typeface="PFDinTextPro-Regular"/>
-                        </a:rPr>
-                        <a:t>Multiple rights-holders: composer, lyricist, arranger, performers</a:t>
+                            <a:srgbClr val="0000FF"/>
+                          </a:solidFill>
+                          <a:latin typeface="PFDinTextPro-Regular"/>
+                          <a:cs typeface="PFDinTextPro-Regular"/>
+                        </a:rPr>
+                        <a:t>Rights-holders</a:t>
+                      </a:r>
+                      <a:r>
+                        <a:rPr lang="en-US" sz="2400" b="0" i="0" baseline="0" dirty="0">
+                          <a:solidFill>
+                            <a:schemeClr val="tx1"/>
+                          </a:solidFill>
+                          <a:latin typeface="PFDinTextPro-Regular"/>
+                          <a:cs typeface="PFDinTextPro-Regular"/>
+                        </a:rPr>
+                        <a:t>: songwriter/composer, lyricist, arranger, performers…</a:t>
                       </a:r>
                     </a:p>
                   </a:txBody>
@@ -9294,7 +9237,47 @@
                           <a:latin typeface="PFDinTextPro-Regular"/>
                           <a:cs typeface="PFDinTextPro-Regular"/>
                         </a:rPr>
-                        <a:t>Multiple licenses to each right</a:t>
+                        <a:t>Each </a:t>
+                      </a:r>
+                      <a:r>
+                        <a:rPr lang="en-US" sz="2400" b="0" i="0" baseline="0" dirty="0">
+                          <a:solidFill>
+                            <a:srgbClr val="0000FF"/>
+                          </a:solidFill>
+                          <a:latin typeface="PFDinTextPro-Regular"/>
+                          <a:cs typeface="PFDinTextPro-Regular"/>
+                        </a:rPr>
+                        <a:t>right</a:t>
+                      </a:r>
+                      <a:r>
+                        <a:rPr lang="en-US" sz="2400" b="0" i="0" baseline="0" dirty="0">
+                          <a:solidFill>
+                            <a:schemeClr val="tx1"/>
+                          </a:solidFill>
+                          <a:latin typeface="PFDinTextPro-Regular"/>
+                          <a:cs typeface="PFDinTextPro-Regular"/>
+                        </a:rPr>
+                        <a:t> may be sold to a new right-holder or </a:t>
+                      </a:r>
+                      <a:r>
+                        <a:rPr lang="en-US" sz="2400" b="0" i="0" baseline="0" dirty="0">
+                          <a:solidFill>
+                            <a:srgbClr val="00B050"/>
+                          </a:solidFill>
+                          <a:latin typeface="PFDinTextPro-Regular"/>
+                          <a:cs typeface="PFDinTextPro-Regular"/>
+                        </a:rPr>
+                        <a:t>licensed</a:t>
+                      </a:r>
+                      <a:r>
+                        <a:rPr lang="en-US" sz="2400" b="0" i="0" baseline="0" dirty="0">
+                          <a:solidFill>
+                            <a:schemeClr val="tx1"/>
+                          </a:solidFill>
+                          <a:latin typeface="PFDinTextPro-Regular"/>
+                          <a:cs typeface="PFDinTextPro-Regular"/>
+                        </a:rPr>
+                        <a:t>. The sale or license terms may include collection &amp; distribution of royalties.</a:t>
                       </a:r>
                     </a:p>
                   </a:txBody>
@@ -9395,108 +9378,47 @@
                           <a:latin typeface="PFDinTextPro-Regular"/>
                           <a:cs typeface="PFDinTextPro-Regular"/>
                         </a:rPr>
-                        <a:t>Royalty collection &amp; distribution under license terms</a:t>
-                      </a:r>
-                    </a:p>
-                  </a:txBody>
-                  <a:tcPr marL="50800" marR="50800" marT="50800" marB="50800">
-                    <a:lnL w="12700" cmpd="sng">
-                      <a:noFill/>
-                    </a:lnL>
-                    <a:lnR w="12700" cmpd="sng">
-                      <a:noFill/>
-                    </a:lnR>
-                    <a:lnT w="12700" cmpd="sng">
-                      <a:noFill/>
-                    </a:lnT>
-                    <a:lnB w="38100" cmpd="sng">
-                      <a:noFill/>
-                    </a:lnB>
-                    <a:lnTlToBr w="12700" cmpd="sng">
-                      <a:noFill/>
-                      <a:prstDash val="solid"/>
-                    </a:lnTlToBr>
-                    <a:lnBlToTr w="12700" cmpd="sng">
-                      <a:noFill/>
-                      <a:prstDash val="solid"/>
-                    </a:lnBlToTr>
-                    <a:noFill/>
-                  </a:tcPr>
-                </a:tc>
-                <a:extLst>
-                  <a:ext uri="{0D108BD9-81ED-4DB2-BD59-A6C34878D82A}">
-                    <a16:rowId xmlns:a16="http://schemas.microsoft.com/office/drawing/2014/main" val="10004"/>
-                  </a:ext>
-                </a:extLst>
-              </a:tr>
-              <a:tr h="228600">
-                <a:tc>
-                  <a:txBody>
-                    <a:bodyPr/>
-                    <a:lstStyle/>
-                    <a:p>
-                      <a:pPr algn="r">
-                        <a:lnSpc>
-                          <a:spcPts val="3000"/>
-                        </a:lnSpc>
-                      </a:pPr>
-                      <a:endParaRPr lang="en-US" sz="2400" b="0" i="0" dirty="0">
-                        <a:solidFill>
-                          <a:schemeClr val="bg1">
-                            <a:lumMod val="50000"/>
-                          </a:schemeClr>
-                        </a:solidFill>
-                        <a:latin typeface="PFDinTextPro-Regular"/>
-                        <a:cs typeface="PFDinTextPro-Regular"/>
-                      </a:endParaRPr>
-                    </a:p>
-                  </a:txBody>
-                  <a:tcPr marL="50800" marR="50800" marT="50800" marB="50800">
-                    <a:lnL w="12700" cmpd="sng">
-                      <a:noFill/>
-                    </a:lnL>
-                    <a:lnR w="12700" cmpd="sng">
-                      <a:noFill/>
-                    </a:lnR>
-                    <a:lnT w="12700" cmpd="sng">
-                      <a:noFill/>
-                    </a:lnT>
-                    <a:lnB w="38100" cmpd="sng">
-                      <a:noFill/>
-                    </a:lnB>
-                    <a:lnTlToBr w="12700" cmpd="sng">
-                      <a:noFill/>
-                      <a:prstDash val="solid"/>
-                    </a:lnTlToBr>
-                    <a:lnBlToTr w="12700" cmpd="sng">
-                      <a:noFill/>
-                      <a:prstDash val="solid"/>
-                    </a:lnBlToTr>
-                    <a:noFill/>
-                  </a:tcPr>
-                </a:tc>
-                <a:tc>
-                  <a:txBody>
-                    <a:bodyPr/>
-                    <a:lstStyle/>
-                    <a:p>
-                      <a:pPr marL="152400" indent="-152400">
-                        <a:lnSpc>
-                          <a:spcPts val="3000"/>
-                        </a:lnSpc>
-                        <a:buSzPct val="75000"/>
-                        <a:buFont typeface="Arial"/>
-                        <a:buChar char="•"/>
-                      </a:pPr>
+                        <a:t>Metadata about both </a:t>
+                      </a:r>
                       <a:r>
                         <a:rPr lang="en-US" sz="2400" b="0" i="0" baseline="0" dirty="0">
                           <a:solidFill>
-                            <a:schemeClr val="tx1"/>
-                          </a:solidFill>
-                          <a:latin typeface="PFDinTextPro-Regular"/>
-                          <a:cs typeface="PFDinTextPro-Regular"/>
-                        </a:rPr>
-                        <a:t>Rights &amp; license metadata includes:</a:t>
+                            <a:srgbClr val="0000FF"/>
+                          </a:solidFill>
+                          <a:latin typeface="PFDinTextPro-Regular"/>
+                          <a:cs typeface="PFDinTextPro-Regular"/>
+                        </a:rPr>
+                        <a:t>rights</a:t>
+                      </a:r>
+                      <a:r>
+                        <a:rPr lang="en-US" sz="2400" b="0" i="0" baseline="0" dirty="0">
+                          <a:solidFill>
+                            <a:schemeClr val="tx1"/>
+                          </a:solidFill>
+                          <a:latin typeface="PFDinTextPro-Regular"/>
+                          <a:cs typeface="PFDinTextPro-Regular"/>
+                        </a:rPr>
+                        <a:t> &amp; </a:t>
+                      </a:r>
+                      <a:r>
+                        <a:rPr lang="en-US" sz="2400" b="0" i="0" baseline="0" dirty="0">
+                          <a:solidFill>
+                            <a:srgbClr val="00B050"/>
+                          </a:solidFill>
+                          <a:latin typeface="PFDinTextPro-Regular"/>
+                          <a:cs typeface="PFDinTextPro-Regular"/>
+                        </a:rPr>
+                        <a:t>licenses</a:t>
+                      </a:r>
+                      <a:r>
+                        <a:rPr lang="en-US" sz="2400" b="0" i="0" baseline="0" dirty="0">
+                          <a:solidFill>
+                            <a:schemeClr val="tx1"/>
+                          </a:solidFill>
+                          <a:latin typeface="PFDinTextPro-Regular"/>
+                          <a:cs typeface="PFDinTextPro-Regular"/>
+                        </a:rPr>
+                        <a:t> include:</a:t>
                       </a:r>
                       <a:br>
                         <a:rPr lang="en-US" sz="2400" b="0" i="0" baseline="0" dirty="0">
@@ -10506,7 +10428,7 @@
             <p:ph type="tbl" sz="quarter" idx="10"/>
             <p:extLst>
               <p:ext uri="{D42A27DB-BD31-4B8C-83A1-F6EECF244321}">
-                <p14:modId xmlns:p14="http://schemas.microsoft.com/office/powerpoint/2010/main" val="2329874590"/>
+                <p14:modId xmlns:p14="http://schemas.microsoft.com/office/powerpoint/2010/main" val="1313171448"/>
               </p:ext>
             </p:extLst>
           </p:nvPr>
@@ -10543,7 +10465,7 @@
                     <a:bodyPr/>
                     <a:lstStyle/>
                     <a:p>
-                      <a:pPr algn="r">
+                      <a:pPr algn="l">
                         <a:lnSpc>
                           <a:spcPts val="3000"/>
                         </a:lnSpc>
@@ -10722,7 +10644,7 @@
                     <a:bodyPr/>
                     <a:lstStyle/>
                     <a:p>
-                      <a:pPr algn="r">
+                      <a:pPr algn="l">
                         <a:lnSpc>
                           <a:spcPts val="3000"/>
                         </a:lnSpc>
@@ -10783,7 +10705,7 @@
                           <a:latin typeface="PFDinTextPro-Regular"/>
                           <a:cs typeface="PFDinTextPro-Regular"/>
                         </a:rPr>
-                        <a:t>streamer</a:t>
+                        <a:t>streaming service, etc</a:t>
                       </a:r>
                     </a:p>
                   </a:txBody>
@@ -10872,7 +10794,7 @@
                           <a:latin typeface="PFDinTextPro-Regular"/>
                           <a:cs typeface="PFDinTextPro-Regular"/>
                         </a:rPr>
-                        <a:t>License those rights</a:t>
+                        <a:t>License or purchase those rights</a:t>
                       </a:r>
                     </a:p>
                     <a:p>
@@ -10949,7 +10871,7 @@
                     <a:bodyPr/>
                     <a:lstStyle/>
                     <a:p>
-                      <a:pPr algn="r">
+                      <a:pPr algn="l">
                         <a:lnSpc>
                           <a:spcPts val="3000"/>
                         </a:lnSpc>
@@ -11070,7 +10992,7 @@
                     <a:bodyPr/>
                     <a:lstStyle/>
                     <a:p>
-                      <a:pPr algn="r">
+                      <a:pPr algn="l">
                         <a:lnSpc>
                           <a:spcPts val="3000"/>
                         </a:lnSpc>
@@ -11414,8 +11336,16 @@
           <a:lstStyle/>
           <a:p>
             <a:r>
+              <a:rPr lang="en-US" cap="small" dirty="0">
+                <a:solidFill>
+                  <a:srgbClr val="FF0000"/>
+                </a:solidFill>
+              </a:rPr>
+              <a:t>Raidar</a:t>
+            </a:r>
+            <a:r>
               <a:rPr lang="en-US" dirty="0"/>
-              <a:t>Functional scope (v1):</a:t>
+              <a:t> functional scope (v1):</a:t>
             </a:r>
           </a:p>
         </p:txBody>
@@ -12226,7 +12156,7 @@
             <p:ph type="tbl" sz="quarter" idx="10"/>
             <p:extLst>
               <p:ext uri="{D42A27DB-BD31-4B8C-83A1-F6EECF244321}">
-                <p14:modId xmlns:p14="http://schemas.microsoft.com/office/powerpoint/2010/main" val="1145839123"/>
+                <p14:modId xmlns:p14="http://schemas.microsoft.com/office/powerpoint/2010/main" val="2794543953"/>
               </p:ext>
             </p:extLst>
           </p:nvPr>
@@ -12263,7 +12193,7 @@
                     <a:bodyPr/>
                     <a:lstStyle/>
                     <a:p>
-                      <a:pPr algn="r">
+                      <a:pPr algn="l">
                         <a:lnSpc>
                           <a:spcPts val="3000"/>
                         </a:lnSpc>
@@ -12278,7 +12208,7 @@
                           <a:latin typeface="PFDinTextPro-Regular"/>
                           <a:cs typeface="PFDinTextPro-Regular"/>
                         </a:rPr>
-                        <a:t>asset</a:t>
+                        <a:t>asset description</a:t>
                       </a:r>
                     </a:p>
                   </a:txBody>
@@ -12387,7 +12317,7 @@
                     <a:bodyPr/>
                     <a:lstStyle/>
                     <a:p>
-                      <a:pPr algn="r">
+                      <a:pPr algn="l">
                         <a:lnSpc>
                           <a:spcPts val="3000"/>
                         </a:lnSpc>
@@ -12402,7 +12332,7 @@
                           <a:latin typeface="PFDinTextPro-Regular"/>
                           <a:cs typeface="PFDinTextPro-Regular"/>
                         </a:rPr>
-                        <a:t>asset metadata</a:t>
+                        <a:t>asset metadata examples</a:t>
                       </a:r>
                     </a:p>
                   </a:txBody>
@@ -12446,12 +12376,14 @@
                       <a:r>
                         <a:rPr lang="en-US" sz="2400" b="0" i="0" baseline="0" dirty="0">
                           <a:solidFill>
-                            <a:schemeClr val="tx1"/>
-                          </a:solidFill>
-                          <a:latin typeface="PFDinTextPro-Regular"/>
-                          <a:cs typeface="PFDinTextPro-Regular"/>
-                        </a:rPr>
-                        <a:t>e.g. :</a:t>
+                            <a:schemeClr val="bg1">
+                              <a:lumMod val="50000"/>
+                            </a:schemeClr>
+                          </a:solidFill>
+                          <a:latin typeface="PFDinTextPro-Regular"/>
+                          <a:cs typeface="PFDinTextPro-Regular"/>
+                        </a:rPr>
+                        <a:t>Examples:</a:t>
                       </a:r>
                     </a:p>
                     <a:p>
@@ -12551,7 +12483,7 @@
                     <a:bodyPr/>
                     <a:lstStyle/>
                     <a:p>
-                      <a:pPr algn="r">
+                      <a:pPr algn="l">
                         <a:lnSpc>
                           <a:spcPts val="3000"/>
                         </a:lnSpc>
@@ -12566,56 +12498,87 @@
                           <a:latin typeface="PFDinTextPro-Regular"/>
                           <a:cs typeface="PFDinTextPro-Regular"/>
                         </a:rPr>
-                        <a:t>right</a:t>
-                      </a:r>
-                    </a:p>
-                  </a:txBody>
-                  <a:tcPr marL="50800" marR="50800" marT="50800" marB="50800">
-                    <a:lnL w="12700" cmpd="sng">
-                      <a:noFill/>
-                    </a:lnL>
-                    <a:lnR w="12700" cmpd="sng">
-                      <a:noFill/>
-                    </a:lnR>
-                    <a:lnT w="12700" cmpd="sng">
-                      <a:noFill/>
-                    </a:lnT>
-                    <a:lnB w="38100" cmpd="sng">
-                      <a:noFill/>
-                    </a:lnB>
-                    <a:lnTlToBr w="12700" cmpd="sng">
-                      <a:noFill/>
-                      <a:prstDash val="solid"/>
-                    </a:lnTlToBr>
-                    <a:lnBlToTr w="12700" cmpd="sng">
-                      <a:noFill/>
-                      <a:prstDash val="solid"/>
-                    </a:lnBlToTr>
-                    <a:noFill/>
-                  </a:tcPr>
-                </a:tc>
-                <a:tc>
-                  <a:txBody>
-                    <a:bodyPr/>
-                    <a:lstStyle/>
-                    <a:p>
-                      <a:pPr marL="0" indent="0">
-                        <a:lnSpc>
-                          <a:spcPts val="3000"/>
-                        </a:lnSpc>
+                        <a:t>right description</a:t>
+                      </a:r>
+                    </a:p>
+                  </a:txBody>
+                  <a:tcPr marL="50800" marR="50800" marT="50800" marB="50800">
+                    <a:lnL w="12700" cmpd="sng">
+                      <a:noFill/>
+                    </a:lnL>
+                    <a:lnR w="12700" cmpd="sng">
+                      <a:noFill/>
+                    </a:lnR>
+                    <a:lnT w="12700" cmpd="sng">
+                      <a:noFill/>
+                    </a:lnT>
+                    <a:lnB w="38100" cmpd="sng">
+                      <a:noFill/>
+                    </a:lnB>
+                    <a:lnTlToBr w="12700" cmpd="sng">
+                      <a:noFill/>
+                      <a:prstDash val="solid"/>
+                    </a:lnTlToBr>
+                    <a:lnBlToTr w="12700" cmpd="sng">
+                      <a:noFill/>
+                      <a:prstDash val="solid"/>
+                    </a:lnBlToTr>
+                    <a:noFill/>
+                  </a:tcPr>
+                </a:tc>
+                <a:tc>
+                  <a:txBody>
+                    <a:bodyPr/>
+                    <a:lstStyle/>
+                    <a:p>
+                      <a:pPr marL="0" marR="0" lvl="0" indent="0" algn="l" defTabSz="457200" rtl="0" eaLnBrk="1" fontAlgn="auto" latinLnBrk="0" hangingPunct="1">
+                        <a:lnSpc>
+                          <a:spcPts val="3000"/>
+                        </a:lnSpc>
+                        <a:spcBef>
+                          <a:spcPts val="0"/>
+                        </a:spcBef>
+                        <a:spcAft>
+                          <a:spcPts val="0"/>
+                        </a:spcAft>
+                        <a:buClrTx/>
                         <a:buSzPct val="75000"/>
                         <a:buFontTx/>
                         <a:buNone/>
+                        <a:tabLst/>
+                        <a:defRPr/>
                       </a:pPr>
                       <a:r>
                         <a:rPr lang="en-US" sz="2400" b="0" i="0" baseline="0" dirty="0">
                           <a:solidFill>
-                            <a:schemeClr val="tx1"/>
-                          </a:solidFill>
-                          <a:latin typeface="PFDinTextPro-Regular"/>
-                          <a:cs typeface="PFDinTextPro-Regular"/>
-                        </a:rPr>
-                        <a:t>e.g., mechanical right, composition right</a:t>
+                            <a:schemeClr val="bg1">
+                              <a:lumMod val="50000"/>
+                            </a:schemeClr>
+                          </a:solidFill>
+                          <a:latin typeface="PFDinTextPro-Regular"/>
+                          <a:cs typeface="PFDinTextPro-Regular"/>
+                        </a:rPr>
+                        <a:t>Examples:</a:t>
+                      </a:r>
+                    </a:p>
+                    <a:p>
+                      <a:pPr marL="0" indent="0">
+                        <a:lnSpc>
+                          <a:spcPts val="3000"/>
+                        </a:lnSpc>
+                        <a:buSzPct val="75000"/>
+                        <a:buFontTx/>
+                        <a:buNone/>
+                      </a:pPr>
+                      <a:r>
+                        <a:rPr lang="en-US" sz="2400" b="0" i="0" baseline="0" dirty="0">
+                          <a:solidFill>
+                            <a:schemeClr val="tx1"/>
+                          </a:solidFill>
+                          <a:latin typeface="PFDinTextPro-Regular"/>
+                          <a:cs typeface="PFDinTextPro-Regular"/>
+                        </a:rPr>
+                        <a:t>mechanical right, performance right</a:t>
                       </a:r>
                     </a:p>
                   </a:txBody>
@@ -12655,7 +12618,7 @@
                     <a:bodyPr/>
                     <a:lstStyle/>
                     <a:p>
-                      <a:pPr algn="r">
+                      <a:pPr algn="l">
                         <a:lnSpc>
                           <a:spcPts val="3000"/>
                         </a:lnSpc>
@@ -12714,12 +12677,14 @@
                       <a:r>
                         <a:rPr lang="en-US" sz="2400" b="0" i="0" baseline="0" dirty="0">
                           <a:solidFill>
-                            <a:schemeClr val="tx1"/>
-                          </a:solidFill>
-                          <a:latin typeface="PFDinTextPro-Regular"/>
-                          <a:cs typeface="PFDinTextPro-Regular"/>
-                        </a:rPr>
-                        <a:t>e.g.:</a:t>
+                            <a:schemeClr val="bg1">
+                              <a:lumMod val="50000"/>
+                            </a:schemeClr>
+                          </a:solidFill>
+                          <a:latin typeface="PFDinTextPro-Regular"/>
+                          <a:cs typeface="PFDinTextPro-Regular"/>
+                        </a:rPr>
+                        <a:t>Examples:</a:t>
                       </a:r>
                     </a:p>
                     <a:p>
@@ -12739,7 +12704,7 @@
                           <a:latin typeface="PFDinTextPro-Regular"/>
                           <a:cs typeface="PFDinTextPro-Regular"/>
                         </a:rPr>
-                        <a:t>Right-holder(s)</a:t>
+                        <a:t>Right-holder(s) identity</a:t>
                       </a:r>
                     </a:p>
                     <a:p>
@@ -12759,27 +12724,7 @@
                           <a:latin typeface="PFDinTextPro-Regular"/>
                           <a:cs typeface="PFDinTextPro-Regular"/>
                         </a:rPr>
-                        <a:t>Splits</a:t>
-                      </a:r>
-                    </a:p>
-                    <a:p>
-                      <a:pPr marL="152400" indent="-152400">
-                        <a:lnSpc>
-                          <a:spcPts val="3000"/>
-                        </a:lnSpc>
-                        <a:buSzPct val="75000"/>
-                        <a:buFont typeface="Arial"/>
-                        <a:buChar char="•"/>
-                      </a:pPr>
-                      <a:r>
-                        <a:rPr lang="en-US" sz="2400" b="0" i="0" baseline="0" dirty="0">
-                          <a:solidFill>
-                            <a:schemeClr val="tx1"/>
-                          </a:solidFill>
-                          <a:latin typeface="PFDinTextPro-Regular"/>
-                          <a:cs typeface="PFDinTextPro-Regular"/>
-                        </a:rPr>
-                        <a:t>Legal jurisdiction of right</a:t>
+                        <a:t>Geographical scope of right</a:t>
                       </a:r>
                     </a:p>
                   </a:txBody>
@@ -12819,7 +12764,7 @@
                     <a:bodyPr/>
                     <a:lstStyle/>
                     <a:p>
-                      <a:pPr algn="r">
+                      <a:pPr algn="l">
                         <a:lnSpc>
                           <a:spcPts val="3000"/>
                         </a:lnSpc>

</xml_diff>

<commit_message>
update with comments from George Howerd
add interworking with external willing sources, sinks

ref #11
</commit_message>
<xml_diff>
--- a/docs/2019 05 10 presentation/2019 05 10 overview.pptx
+++ b/docs/2019 05 10 presentation/2019 05 10 overview.pptx
@@ -5,7 +5,7 @@
     <p:sldMasterId id="2147483648" r:id="rId1"/>
   </p:sldMasterIdLst>
   <p:notesMasterIdLst>
-    <p:notesMasterId r:id="rId28"/>
+    <p:notesMasterId r:id="rId30"/>
   </p:notesMasterIdLst>
   <p:sldIdLst>
     <p:sldId id="277" r:id="rId2"/>
@@ -28,12 +28,14 @@
     <p:sldId id="297" r:id="rId19"/>
     <p:sldId id="298" r:id="rId20"/>
     <p:sldId id="299" r:id="rId21"/>
-    <p:sldId id="300" r:id="rId22"/>
-    <p:sldId id="301" r:id="rId23"/>
-    <p:sldId id="280" r:id="rId24"/>
-    <p:sldId id="290" r:id="rId25"/>
-    <p:sldId id="289" r:id="rId26"/>
-    <p:sldId id="281" r:id="rId27"/>
+    <p:sldId id="302" r:id="rId22"/>
+    <p:sldId id="303" r:id="rId23"/>
+    <p:sldId id="300" r:id="rId24"/>
+    <p:sldId id="301" r:id="rId25"/>
+    <p:sldId id="280" r:id="rId26"/>
+    <p:sldId id="290" r:id="rId27"/>
+    <p:sldId id="289" r:id="rId28"/>
+    <p:sldId id="281" r:id="rId29"/>
   </p:sldIdLst>
   <p:sldSz cx="9144000" cy="6858000" type="screen4x3"/>
   <p:notesSz cx="6858000" cy="9144000"/>
@@ -233,7 +235,7 @@
           <a:p>
             <a:fld id="{CB499594-5908-194F-A8D4-32B5BC28CDDF}" type="datetimeFigureOut">
               <a:rPr lang="en-US" smtClean="0"/>
-              <a:t>5/9/19</a:t>
+              <a:t>5/10/19</a:t>
             </a:fld>
             <a:endParaRPr lang="en-US"/>
           </a:p>
@@ -769,7 +771,7 @@
             </a:r>
             <a:fld id="{A8CF89D8-95B5-F942-92F2-D9D00BC00785}" type="datetime1">
               <a:rPr lang="en-US" smtClean="0"/>
-              <a:t>5/9/19</a:t>
+              <a:t>5/10/19</a:t>
             </a:fld>
             <a:endParaRPr lang="en-US" dirty="0"/>
           </a:p>
@@ -1268,7 +1270,7 @@
             <p:ph type="tbl" sz="quarter" idx="10"/>
             <p:extLst>
               <p:ext uri="{D42A27DB-BD31-4B8C-83A1-F6EECF244321}">
-                <p14:modId xmlns:p14="http://schemas.microsoft.com/office/powerpoint/2010/main" val="1985168131"/>
+                <p14:modId xmlns:p14="http://schemas.microsoft.com/office/powerpoint/2010/main" val="1537042379"/>
               </p:ext>
             </p:extLst>
           </p:nvPr>
@@ -1649,7 +1651,7 @@
                         <a:t>mit</a:t>
                       </a:r>
                       <a:r>
-                        <a:rPr lang="en-US" sz="3600" b="0" i="0" baseline="0" dirty="0">
+                        <a:rPr lang="en-US" sz="3600" b="0" i="0" cap="small" baseline="0" dirty="0">
                           <a:solidFill>
                             <a:schemeClr val="bg1">
                               <a:lumMod val="50000"/>
@@ -1658,10 +1660,10 @@
                           <a:latin typeface="PFDinTextPro-Regular"/>
                           <a:cs typeface="PFDinTextPro-Regular"/>
                         </a:rPr>
-                        <a:t> and</a:t>
+                        <a:t> &amp; </a:t>
                       </a:r>
                       <a:br>
-                        <a:rPr lang="en-US" sz="3600" b="0" i="0" baseline="0" dirty="0">
+                        <a:rPr lang="en-US" sz="3600" b="0" i="0" cap="small" baseline="0" dirty="0">
                           <a:solidFill>
                             <a:schemeClr val="bg1">
                               <a:lumMod val="50000"/>
@@ -4187,10 +4189,10 @@
       </p:pic>
       <p:grpSp>
         <p:nvGrpSpPr>
-          <p:cNvPr id="26" name="Group 25">
+          <p:cNvPr id="3" name="Group 2">
             <a:extLst>
               <a:ext uri="{FF2B5EF4-FFF2-40B4-BE49-F238E27FC236}">
-                <a16:creationId xmlns:a16="http://schemas.microsoft.com/office/drawing/2014/main" id="{FF4A5C3C-ABC1-CB46-8B23-772B06636416}"/>
+                <a16:creationId xmlns:a16="http://schemas.microsoft.com/office/drawing/2014/main" id="{154BA6DF-E02C-4E41-B009-27C8331AB833}"/>
               </a:ext>
             </a:extLst>
           </p:cNvPr>
@@ -4199,28 +4201,133 @@
         </p:nvGrpSpPr>
         <p:grpSpPr>
           <a:xfrm>
-            <a:off x="1914861" y="4023358"/>
-            <a:ext cx="141643" cy="457200"/>
-            <a:chOff x="1914861" y="4077148"/>
-            <a:chExt cx="141643" cy="457200"/>
+            <a:off x="1267647" y="4023358"/>
+            <a:ext cx="1992388" cy="457200"/>
+            <a:chOff x="1267647" y="4023358"/>
+            <a:chExt cx="1992388" cy="457200"/>
           </a:xfrm>
         </p:grpSpPr>
-        <p:cxnSp>
-          <p:nvCxnSpPr>
-            <p:cNvPr id="5" name="Straight Connector 4">
+        <p:grpSp>
+          <p:nvGrpSpPr>
+            <p:cNvPr id="26" name="Group 25">
               <a:extLst>
                 <a:ext uri="{FF2B5EF4-FFF2-40B4-BE49-F238E27FC236}">
-                  <a16:creationId xmlns:a16="http://schemas.microsoft.com/office/drawing/2014/main" id="{066D036F-B8F7-CB49-9839-3CD6066C771E}"/>
+                  <a16:creationId xmlns:a16="http://schemas.microsoft.com/office/drawing/2014/main" id="{FF4A5C3C-ABC1-CB46-8B23-772B06636416}"/>
                 </a:ext>
               </a:extLst>
             </p:cNvPr>
-            <p:cNvCxnSpPr/>
+            <p:cNvGrpSpPr/>
+            <p:nvPr/>
+          </p:nvGrpSpPr>
+          <p:grpSpPr>
+            <a:xfrm>
+              <a:off x="1914861" y="4023358"/>
+              <a:ext cx="141643" cy="457200"/>
+              <a:chOff x="1914861" y="4077148"/>
+              <a:chExt cx="141643" cy="457200"/>
+            </a:xfrm>
+          </p:grpSpPr>
+          <p:cxnSp>
+            <p:nvCxnSpPr>
+              <p:cNvPr id="5" name="Straight Connector 4">
+                <a:extLst>
+                  <a:ext uri="{FF2B5EF4-FFF2-40B4-BE49-F238E27FC236}">
+                    <a16:creationId xmlns:a16="http://schemas.microsoft.com/office/drawing/2014/main" id="{066D036F-B8F7-CB49-9839-3CD6066C771E}"/>
+                  </a:ext>
+                </a:extLst>
+              </p:cNvPr>
+              <p:cNvCxnSpPr/>
+              <p:nvPr/>
+            </p:nvCxnSpPr>
+            <p:spPr>
+              <a:xfrm>
+                <a:off x="1914861" y="4077148"/>
+                <a:ext cx="0" cy="457200"/>
+              </a:xfrm>
+              <a:prstGeom prst="line">
+                <a:avLst/>
+              </a:prstGeom>
+              <a:ln w="38100">
+                <a:solidFill>
+                  <a:schemeClr val="tx1"/>
+                </a:solidFill>
+              </a:ln>
+            </p:spPr>
+            <p:style>
+              <a:lnRef idx="2">
+                <a:schemeClr val="accent1"/>
+              </a:lnRef>
+              <a:fillRef idx="0">
+                <a:schemeClr val="accent1"/>
+              </a:fillRef>
+              <a:effectRef idx="1">
+                <a:schemeClr val="accent1"/>
+              </a:effectRef>
+              <a:fontRef idx="minor">
+                <a:schemeClr val="tx1"/>
+              </a:fontRef>
+            </p:style>
+          </p:cxnSp>
+          <p:cxnSp>
+            <p:nvCxnSpPr>
+              <p:cNvPr id="22" name="Straight Connector 21">
+                <a:extLst>
+                  <a:ext uri="{FF2B5EF4-FFF2-40B4-BE49-F238E27FC236}">
+                    <a16:creationId xmlns:a16="http://schemas.microsoft.com/office/drawing/2014/main" id="{02FDA3C5-4FB7-3B40-BF0B-1962FDC032CA}"/>
+                  </a:ext>
+                </a:extLst>
+              </p:cNvPr>
+              <p:cNvCxnSpPr/>
+              <p:nvPr/>
+            </p:nvCxnSpPr>
+            <p:spPr>
+              <a:xfrm>
+                <a:off x="2056504" y="4077148"/>
+                <a:ext cx="0" cy="457200"/>
+              </a:xfrm>
+              <a:prstGeom prst="line">
+                <a:avLst/>
+              </a:prstGeom>
+              <a:ln w="38100">
+                <a:solidFill>
+                  <a:schemeClr val="tx1"/>
+                </a:solidFill>
+              </a:ln>
+            </p:spPr>
+            <p:style>
+              <a:lnRef idx="2">
+                <a:schemeClr val="accent1"/>
+              </a:lnRef>
+              <a:fillRef idx="0">
+                <a:schemeClr val="accent1"/>
+              </a:fillRef>
+              <a:effectRef idx="1">
+                <a:schemeClr val="accent1"/>
+              </a:effectRef>
+              <a:fontRef idx="minor">
+                <a:schemeClr val="tx1"/>
+              </a:fontRef>
+            </p:style>
+          </p:cxnSp>
+        </p:grpSp>
+        <p:cxnSp>
+          <p:nvCxnSpPr>
+            <p:cNvPr id="23" name="Straight Connector 22">
+              <a:extLst>
+                <a:ext uri="{FF2B5EF4-FFF2-40B4-BE49-F238E27FC236}">
+                  <a16:creationId xmlns:a16="http://schemas.microsoft.com/office/drawing/2014/main" id="{5B117328-E65B-B64D-98C6-9395296569B9}"/>
+                </a:ext>
+              </a:extLst>
+            </p:cNvPr>
+            <p:cNvCxnSpPr>
+              <a:cxnSpLocks/>
+            </p:cNvCxnSpPr>
             <p:nvPr/>
           </p:nvCxnSpPr>
           <p:spPr>
-            <a:xfrm>
-              <a:off x="1914861" y="4077148"/>
-              <a:ext cx="0" cy="457200"/>
+            <a:xfrm flipH="1">
+              <a:off x="2056504" y="4260028"/>
+              <a:ext cx="1203531" cy="0"/>
             </a:xfrm>
             <a:prstGeom prst="line">
               <a:avLst/>
@@ -4248,20 +4355,23 @@
         </p:cxnSp>
         <p:cxnSp>
           <p:nvCxnSpPr>
-            <p:cNvPr id="22" name="Straight Connector 21">
+            <p:cNvPr id="27" name="Straight Connector 26">
               <a:extLst>
                 <a:ext uri="{FF2B5EF4-FFF2-40B4-BE49-F238E27FC236}">
-                  <a16:creationId xmlns:a16="http://schemas.microsoft.com/office/drawing/2014/main" id="{02FDA3C5-4FB7-3B40-BF0B-1962FDC032CA}"/>
+                  <a16:creationId xmlns:a16="http://schemas.microsoft.com/office/drawing/2014/main" id="{7509D071-EF0B-6B43-A2AB-8349F6ACC83F}"/>
                 </a:ext>
               </a:extLst>
             </p:cNvPr>
-            <p:cNvCxnSpPr/>
+            <p:cNvCxnSpPr>
+              <a:cxnSpLocks/>
+              <a:endCxn id="9" idx="3"/>
+            </p:cNvCxnSpPr>
             <p:nvPr/>
           </p:nvCxnSpPr>
           <p:spPr>
-            <a:xfrm>
-              <a:off x="2056504" y="4077148"/>
-              <a:ext cx="0" cy="457200"/>
+            <a:xfrm flipH="1">
+              <a:off x="1267647" y="4260028"/>
+              <a:ext cx="647216" cy="6158"/>
             </a:xfrm>
             <a:prstGeom prst="line">
               <a:avLst/>
@@ -4288,93 +4398,6 @@
           </p:style>
         </p:cxnSp>
       </p:grpSp>
-      <p:cxnSp>
-        <p:nvCxnSpPr>
-          <p:cNvPr id="23" name="Straight Connector 22">
-            <a:extLst>
-              <a:ext uri="{FF2B5EF4-FFF2-40B4-BE49-F238E27FC236}">
-                <a16:creationId xmlns:a16="http://schemas.microsoft.com/office/drawing/2014/main" id="{5B117328-E65B-B64D-98C6-9395296569B9}"/>
-              </a:ext>
-            </a:extLst>
-          </p:cNvPr>
-          <p:cNvCxnSpPr>
-            <a:cxnSpLocks/>
-          </p:cNvCxnSpPr>
-          <p:nvPr/>
-        </p:nvCxnSpPr>
-        <p:spPr>
-          <a:xfrm flipH="1">
-            <a:off x="2056504" y="4260028"/>
-            <a:ext cx="1203531" cy="0"/>
-          </a:xfrm>
-          <a:prstGeom prst="line">
-            <a:avLst/>
-          </a:prstGeom>
-          <a:ln w="38100">
-            <a:solidFill>
-              <a:schemeClr val="tx1"/>
-            </a:solidFill>
-          </a:ln>
-        </p:spPr>
-        <p:style>
-          <a:lnRef idx="2">
-            <a:schemeClr val="accent1"/>
-          </a:lnRef>
-          <a:fillRef idx="0">
-            <a:schemeClr val="accent1"/>
-          </a:fillRef>
-          <a:effectRef idx="1">
-            <a:schemeClr val="accent1"/>
-          </a:effectRef>
-          <a:fontRef idx="minor">
-            <a:schemeClr val="tx1"/>
-          </a:fontRef>
-        </p:style>
-      </p:cxnSp>
-      <p:cxnSp>
-        <p:nvCxnSpPr>
-          <p:cNvPr id="27" name="Straight Connector 26">
-            <a:extLst>
-              <a:ext uri="{FF2B5EF4-FFF2-40B4-BE49-F238E27FC236}">
-                <a16:creationId xmlns:a16="http://schemas.microsoft.com/office/drawing/2014/main" id="{7509D071-EF0B-6B43-A2AB-8349F6ACC83F}"/>
-              </a:ext>
-            </a:extLst>
-          </p:cNvPr>
-          <p:cNvCxnSpPr>
-            <a:cxnSpLocks/>
-            <a:endCxn id="9" idx="3"/>
-          </p:cNvCxnSpPr>
-          <p:nvPr/>
-        </p:nvCxnSpPr>
-        <p:spPr>
-          <a:xfrm flipH="1">
-            <a:off x="1267647" y="4260028"/>
-            <a:ext cx="647216" cy="6158"/>
-          </a:xfrm>
-          <a:prstGeom prst="line">
-            <a:avLst/>
-          </a:prstGeom>
-          <a:ln w="38100">
-            <a:solidFill>
-              <a:schemeClr val="tx1"/>
-            </a:solidFill>
-          </a:ln>
-        </p:spPr>
-        <p:style>
-          <a:lnRef idx="2">
-            <a:schemeClr val="accent1"/>
-          </a:lnRef>
-          <a:fillRef idx="0">
-            <a:schemeClr val="accent1"/>
-          </a:fillRef>
-          <a:effectRef idx="1">
-            <a:schemeClr val="accent1"/>
-          </a:effectRef>
-          <a:fontRef idx="minor">
-            <a:schemeClr val="tx1"/>
-          </a:fontRef>
-        </p:style>
-      </p:cxnSp>
     </p:spTree>
     <p:extLst>
       <p:ext uri="{BB962C8B-B14F-4D97-AF65-F5344CB8AC3E}">
@@ -10999,6 +11022,1287 @@
       </p:grpSpPr>
       <p:sp>
         <p:nvSpPr>
+          <p:cNvPr id="2" name="Title 1"/>
+          <p:cNvSpPr>
+            <a:spLocks noGrp="1"/>
+          </p:cNvSpPr>
+          <p:nvPr>
+            <p:ph type="title"/>
+          </p:nvPr>
+        </p:nvSpPr>
+        <p:spPr/>
+        <p:txBody>
+          <a:bodyPr/>
+          <a:lstStyle/>
+          <a:p>
+            <a:r>
+              <a:rPr lang="en-US" dirty="0"/>
+              <a:t>Architecture</a:t>
+            </a:r>
+          </a:p>
+        </p:txBody>
+      </p:sp>
+      <p:sp>
+        <p:nvSpPr>
+          <p:cNvPr id="6" name="Rectangle 5">
+            <a:extLst>
+              <a:ext uri="{FF2B5EF4-FFF2-40B4-BE49-F238E27FC236}">
+                <a16:creationId xmlns:a16="http://schemas.microsoft.com/office/drawing/2014/main" id="{9B7C2029-6098-3747-B46F-AFD8FF1DE869}"/>
+              </a:ext>
+            </a:extLst>
+          </p:cNvPr>
+          <p:cNvSpPr/>
+          <p:nvPr/>
+        </p:nvSpPr>
+        <p:spPr>
+          <a:xfrm>
+            <a:off x="457200" y="1129085"/>
+            <a:ext cx="8657368" cy="646331"/>
+          </a:xfrm>
+          <a:prstGeom prst="rect">
+            <a:avLst/>
+          </a:prstGeom>
+        </p:spPr>
+        <p:txBody>
+          <a:bodyPr wrap="square">
+            <a:spAutoFit/>
+          </a:bodyPr>
+          <a:lstStyle/>
+          <a:p>
+            <a:r>
+              <a:rPr lang="en-US" sz="3600" dirty="0">
+                <a:latin typeface="PF DIN Text Pro Light" panose="02000506030000020004" pitchFamily="2" charset="0"/>
+              </a:rPr>
+              <a:t>Interwork with willing, external data sources…</a:t>
+            </a:r>
+          </a:p>
+        </p:txBody>
+      </p:sp>
+      <p:sp>
+        <p:nvSpPr>
+          <p:cNvPr id="7" name="Rounded Rectangle 6">
+            <a:extLst>
+              <a:ext uri="{FF2B5EF4-FFF2-40B4-BE49-F238E27FC236}">
+                <a16:creationId xmlns:a16="http://schemas.microsoft.com/office/drawing/2014/main" id="{615C7128-7973-4F42-935C-83118AE00AE5}"/>
+              </a:ext>
+            </a:extLst>
+          </p:cNvPr>
+          <p:cNvSpPr/>
+          <p:nvPr/>
+        </p:nvSpPr>
+        <p:spPr>
+          <a:xfrm>
+            <a:off x="3087445" y="3429000"/>
+            <a:ext cx="1387731" cy="2240280"/>
+          </a:xfrm>
+          <a:prstGeom prst="roundRect">
+            <a:avLst>
+              <a:gd name="adj" fmla="val 4574"/>
+            </a:avLst>
+          </a:prstGeom>
+          <a:solidFill>
+            <a:schemeClr val="bg1">
+              <a:lumMod val="85000"/>
+            </a:schemeClr>
+          </a:solidFill>
+          <a:ln>
+            <a:noFill/>
+          </a:ln>
+          <a:effectLst/>
+        </p:spPr>
+        <p:style>
+          <a:lnRef idx="1">
+            <a:schemeClr val="accent1"/>
+          </a:lnRef>
+          <a:fillRef idx="3">
+            <a:schemeClr val="accent1"/>
+          </a:fillRef>
+          <a:effectRef idx="2">
+            <a:schemeClr val="accent1"/>
+          </a:effectRef>
+          <a:fontRef idx="minor">
+            <a:schemeClr val="lt1"/>
+          </a:fontRef>
+        </p:style>
+        <p:txBody>
+          <a:bodyPr rtlCol="0" anchor="ctr"/>
+          <a:lstStyle/>
+          <a:p>
+            <a:pPr algn="ctr"/>
+            <a:endParaRPr lang="en-US"/>
+          </a:p>
+        </p:txBody>
+      </p:sp>
+      <p:grpSp>
+        <p:nvGrpSpPr>
+          <p:cNvPr id="30" name="Group 29">
+            <a:extLst>
+              <a:ext uri="{FF2B5EF4-FFF2-40B4-BE49-F238E27FC236}">
+                <a16:creationId xmlns:a16="http://schemas.microsoft.com/office/drawing/2014/main" id="{B2BEC318-758F-3041-B37A-3715114407B6}"/>
+              </a:ext>
+            </a:extLst>
+          </p:cNvPr>
+          <p:cNvGrpSpPr/>
+          <p:nvPr/>
+        </p:nvGrpSpPr>
+        <p:grpSpPr>
+          <a:xfrm>
+            <a:off x="4687841" y="5980749"/>
+            <a:ext cx="141643" cy="457200"/>
+            <a:chOff x="1914861" y="4077148"/>
+            <a:chExt cx="141643" cy="457200"/>
+          </a:xfrm>
+        </p:grpSpPr>
+        <p:cxnSp>
+          <p:nvCxnSpPr>
+            <p:cNvPr id="38" name="Straight Connector 37">
+              <a:extLst>
+                <a:ext uri="{FF2B5EF4-FFF2-40B4-BE49-F238E27FC236}">
+                  <a16:creationId xmlns:a16="http://schemas.microsoft.com/office/drawing/2014/main" id="{84510B1D-72A6-144C-A759-48486ACC6783}"/>
+                </a:ext>
+              </a:extLst>
+            </p:cNvPr>
+            <p:cNvCxnSpPr/>
+            <p:nvPr/>
+          </p:nvCxnSpPr>
+          <p:spPr>
+            <a:xfrm>
+              <a:off x="1914861" y="4077148"/>
+              <a:ext cx="0" cy="457200"/>
+            </a:xfrm>
+            <a:prstGeom prst="line">
+              <a:avLst/>
+            </a:prstGeom>
+            <a:ln w="38100">
+              <a:solidFill>
+                <a:schemeClr val="tx1"/>
+              </a:solidFill>
+            </a:ln>
+          </p:spPr>
+          <p:style>
+            <a:lnRef idx="2">
+              <a:schemeClr val="accent1"/>
+            </a:lnRef>
+            <a:fillRef idx="0">
+              <a:schemeClr val="accent1"/>
+            </a:fillRef>
+            <a:effectRef idx="1">
+              <a:schemeClr val="accent1"/>
+            </a:effectRef>
+            <a:fontRef idx="minor">
+              <a:schemeClr val="tx1"/>
+            </a:fontRef>
+          </p:style>
+        </p:cxnSp>
+        <p:cxnSp>
+          <p:nvCxnSpPr>
+            <p:cNvPr id="39" name="Straight Connector 38">
+              <a:extLst>
+                <a:ext uri="{FF2B5EF4-FFF2-40B4-BE49-F238E27FC236}">
+                  <a16:creationId xmlns:a16="http://schemas.microsoft.com/office/drawing/2014/main" id="{1CE3EB59-4397-4243-B8B7-6AA000BA5671}"/>
+                </a:ext>
+              </a:extLst>
+            </p:cNvPr>
+            <p:cNvCxnSpPr/>
+            <p:nvPr/>
+          </p:nvCxnSpPr>
+          <p:spPr>
+            <a:xfrm>
+              <a:off x="2056504" y="4077148"/>
+              <a:ext cx="0" cy="457200"/>
+            </a:xfrm>
+            <a:prstGeom prst="line">
+              <a:avLst/>
+            </a:prstGeom>
+            <a:ln w="38100">
+              <a:solidFill>
+                <a:schemeClr val="tx1"/>
+              </a:solidFill>
+            </a:ln>
+          </p:spPr>
+          <p:style>
+            <a:lnRef idx="2">
+              <a:schemeClr val="accent1"/>
+            </a:lnRef>
+            <a:fillRef idx="0">
+              <a:schemeClr val="accent1"/>
+            </a:fillRef>
+            <a:effectRef idx="1">
+              <a:schemeClr val="accent1"/>
+            </a:effectRef>
+            <a:fontRef idx="minor">
+              <a:schemeClr val="tx1"/>
+            </a:fontRef>
+          </p:style>
+        </p:cxnSp>
+      </p:grpSp>
+      <p:cxnSp>
+        <p:nvCxnSpPr>
+          <p:cNvPr id="40" name="Straight Connector 39">
+            <a:extLst>
+              <a:ext uri="{FF2B5EF4-FFF2-40B4-BE49-F238E27FC236}">
+                <a16:creationId xmlns:a16="http://schemas.microsoft.com/office/drawing/2014/main" id="{531C637E-8A23-944B-9CE8-00F7A22B95AA}"/>
+              </a:ext>
+            </a:extLst>
+          </p:cNvPr>
+          <p:cNvCxnSpPr>
+            <a:cxnSpLocks/>
+          </p:cNvCxnSpPr>
+          <p:nvPr/>
+        </p:nvCxnSpPr>
+        <p:spPr>
+          <a:xfrm flipH="1">
+            <a:off x="4829485" y="6217419"/>
+            <a:ext cx="391309" cy="0"/>
+          </a:xfrm>
+          <a:prstGeom prst="line">
+            <a:avLst/>
+          </a:prstGeom>
+          <a:ln w="38100">
+            <a:solidFill>
+              <a:schemeClr val="tx1"/>
+            </a:solidFill>
+          </a:ln>
+        </p:spPr>
+        <p:style>
+          <a:lnRef idx="2">
+            <a:schemeClr val="accent1"/>
+          </a:lnRef>
+          <a:fillRef idx="0">
+            <a:schemeClr val="accent1"/>
+          </a:fillRef>
+          <a:effectRef idx="1">
+            <a:schemeClr val="accent1"/>
+          </a:effectRef>
+          <a:fontRef idx="minor">
+            <a:schemeClr val="tx1"/>
+          </a:fontRef>
+        </p:style>
+      </p:cxnSp>
+      <p:cxnSp>
+        <p:nvCxnSpPr>
+          <p:cNvPr id="41" name="Straight Connector 40">
+            <a:extLst>
+              <a:ext uri="{FF2B5EF4-FFF2-40B4-BE49-F238E27FC236}">
+                <a16:creationId xmlns:a16="http://schemas.microsoft.com/office/drawing/2014/main" id="{10BF2B2D-1770-AE46-92AA-A4F0D6B6A2F8}"/>
+              </a:ext>
+            </a:extLst>
+          </p:cNvPr>
+          <p:cNvCxnSpPr>
+            <a:cxnSpLocks/>
+          </p:cNvCxnSpPr>
+          <p:nvPr/>
+        </p:nvCxnSpPr>
+        <p:spPr>
+          <a:xfrm flipH="1">
+            <a:off x="4067281" y="6208066"/>
+            <a:ext cx="620560" cy="6158"/>
+          </a:xfrm>
+          <a:prstGeom prst="line">
+            <a:avLst/>
+          </a:prstGeom>
+          <a:ln w="38100">
+            <a:solidFill>
+              <a:schemeClr val="tx1"/>
+            </a:solidFill>
+          </a:ln>
+        </p:spPr>
+        <p:style>
+          <a:lnRef idx="2">
+            <a:schemeClr val="accent1"/>
+          </a:lnRef>
+          <a:fillRef idx="0">
+            <a:schemeClr val="accent1"/>
+          </a:fillRef>
+          <a:effectRef idx="1">
+            <a:schemeClr val="accent1"/>
+          </a:effectRef>
+          <a:fontRef idx="minor">
+            <a:schemeClr val="tx1"/>
+          </a:fontRef>
+        </p:style>
+      </p:cxnSp>
+      <p:pic>
+        <p:nvPicPr>
+          <p:cNvPr id="42" name="Picture 41">
+            <a:extLst>
+              <a:ext uri="{FF2B5EF4-FFF2-40B4-BE49-F238E27FC236}">
+                <a16:creationId xmlns:a16="http://schemas.microsoft.com/office/drawing/2014/main" id="{C1AF8851-498E-1C4B-8AF0-86F0DC333F45}"/>
+              </a:ext>
+            </a:extLst>
+          </p:cNvPr>
+          <p:cNvPicPr>
+            <a:picLocks noChangeAspect="1"/>
+          </p:cNvPicPr>
+          <p:nvPr/>
+        </p:nvPicPr>
+        <p:blipFill>
+          <a:blip r:embed="rId2"/>
+          <a:stretch>
+            <a:fillRect/>
+          </a:stretch>
+        </p:blipFill>
+        <p:spPr>
+          <a:xfrm>
+            <a:off x="5220794" y="5752149"/>
+            <a:ext cx="914400" cy="914400"/>
+          </a:xfrm>
+          <a:prstGeom prst="rect">
+            <a:avLst/>
+          </a:prstGeom>
+        </p:spPr>
+      </p:pic>
+      <p:cxnSp>
+        <p:nvCxnSpPr>
+          <p:cNvPr id="43" name="Straight Connector 42">
+            <a:extLst>
+              <a:ext uri="{FF2B5EF4-FFF2-40B4-BE49-F238E27FC236}">
+                <a16:creationId xmlns:a16="http://schemas.microsoft.com/office/drawing/2014/main" id="{F7C77A03-5B6F-834D-83AE-23239BD46235}"/>
+              </a:ext>
+            </a:extLst>
+          </p:cNvPr>
+          <p:cNvCxnSpPr>
+            <a:cxnSpLocks/>
+          </p:cNvCxnSpPr>
+          <p:nvPr/>
+        </p:nvCxnSpPr>
+        <p:spPr>
+          <a:xfrm>
+            <a:off x="3717234" y="4723386"/>
+            <a:ext cx="350046" cy="1484680"/>
+          </a:xfrm>
+          <a:prstGeom prst="line">
+            <a:avLst/>
+          </a:prstGeom>
+          <a:ln w="38100">
+            <a:solidFill>
+              <a:schemeClr val="tx1"/>
+            </a:solidFill>
+          </a:ln>
+        </p:spPr>
+        <p:style>
+          <a:lnRef idx="2">
+            <a:schemeClr val="accent1"/>
+          </a:lnRef>
+          <a:fillRef idx="0">
+            <a:schemeClr val="accent1"/>
+          </a:fillRef>
+          <a:effectRef idx="1">
+            <a:schemeClr val="accent1"/>
+          </a:effectRef>
+          <a:fontRef idx="minor">
+            <a:schemeClr val="tx1"/>
+          </a:fontRef>
+        </p:style>
+      </p:cxnSp>
+      <p:grpSp>
+        <p:nvGrpSpPr>
+          <p:cNvPr id="45" name="Group 44">
+            <a:extLst>
+              <a:ext uri="{FF2B5EF4-FFF2-40B4-BE49-F238E27FC236}">
+                <a16:creationId xmlns:a16="http://schemas.microsoft.com/office/drawing/2014/main" id="{AC76A361-14B1-6C42-9BDB-ADA1C748CA83}"/>
+              </a:ext>
+            </a:extLst>
+          </p:cNvPr>
+          <p:cNvGrpSpPr/>
+          <p:nvPr/>
+        </p:nvGrpSpPr>
+        <p:grpSpPr>
+          <a:xfrm rot="16200000">
+            <a:off x="3592835" y="3132127"/>
+            <a:ext cx="141643" cy="457200"/>
+            <a:chOff x="1914861" y="4077148"/>
+            <a:chExt cx="141643" cy="457200"/>
+          </a:xfrm>
+        </p:grpSpPr>
+        <p:cxnSp>
+          <p:nvCxnSpPr>
+            <p:cNvPr id="46" name="Straight Connector 45">
+              <a:extLst>
+                <a:ext uri="{FF2B5EF4-FFF2-40B4-BE49-F238E27FC236}">
+                  <a16:creationId xmlns:a16="http://schemas.microsoft.com/office/drawing/2014/main" id="{C9D706EB-3F4E-1545-B710-5E1181C9A63A}"/>
+                </a:ext>
+              </a:extLst>
+            </p:cNvPr>
+            <p:cNvCxnSpPr/>
+            <p:nvPr/>
+          </p:nvCxnSpPr>
+          <p:spPr>
+            <a:xfrm>
+              <a:off x="1914861" y="4077148"/>
+              <a:ext cx="0" cy="457200"/>
+            </a:xfrm>
+            <a:prstGeom prst="line">
+              <a:avLst/>
+            </a:prstGeom>
+            <a:ln w="38100">
+              <a:solidFill>
+                <a:schemeClr val="tx1"/>
+              </a:solidFill>
+            </a:ln>
+          </p:spPr>
+          <p:style>
+            <a:lnRef idx="2">
+              <a:schemeClr val="accent1"/>
+            </a:lnRef>
+            <a:fillRef idx="0">
+              <a:schemeClr val="accent1"/>
+            </a:fillRef>
+            <a:effectRef idx="1">
+              <a:schemeClr val="accent1"/>
+            </a:effectRef>
+            <a:fontRef idx="minor">
+              <a:schemeClr val="tx1"/>
+            </a:fontRef>
+          </p:style>
+        </p:cxnSp>
+        <p:cxnSp>
+          <p:nvCxnSpPr>
+            <p:cNvPr id="47" name="Straight Connector 46">
+              <a:extLst>
+                <a:ext uri="{FF2B5EF4-FFF2-40B4-BE49-F238E27FC236}">
+                  <a16:creationId xmlns:a16="http://schemas.microsoft.com/office/drawing/2014/main" id="{8BA2EE6A-DFBC-9C4A-AAE7-8C08F59313A1}"/>
+                </a:ext>
+              </a:extLst>
+            </p:cNvPr>
+            <p:cNvCxnSpPr/>
+            <p:nvPr/>
+          </p:nvCxnSpPr>
+          <p:spPr>
+            <a:xfrm>
+              <a:off x="2056504" y="4077148"/>
+              <a:ext cx="0" cy="457200"/>
+            </a:xfrm>
+            <a:prstGeom prst="line">
+              <a:avLst/>
+            </a:prstGeom>
+            <a:ln w="38100">
+              <a:solidFill>
+                <a:schemeClr val="tx1"/>
+              </a:solidFill>
+            </a:ln>
+          </p:spPr>
+          <p:style>
+            <a:lnRef idx="2">
+              <a:schemeClr val="accent1"/>
+            </a:lnRef>
+            <a:fillRef idx="0">
+              <a:schemeClr val="accent1"/>
+            </a:fillRef>
+            <a:effectRef idx="1">
+              <a:schemeClr val="accent1"/>
+            </a:effectRef>
+            <a:fontRef idx="minor">
+              <a:schemeClr val="tx1"/>
+            </a:fontRef>
+          </p:style>
+        </p:cxnSp>
+      </p:grpSp>
+      <p:cxnSp>
+        <p:nvCxnSpPr>
+          <p:cNvPr id="51" name="Straight Connector 50">
+            <a:extLst>
+              <a:ext uri="{FF2B5EF4-FFF2-40B4-BE49-F238E27FC236}">
+                <a16:creationId xmlns:a16="http://schemas.microsoft.com/office/drawing/2014/main" id="{9CA53198-CE5E-A44B-A19E-E8C022E42768}"/>
+              </a:ext>
+            </a:extLst>
+          </p:cNvPr>
+          <p:cNvCxnSpPr>
+            <a:cxnSpLocks/>
+          </p:cNvCxnSpPr>
+          <p:nvPr/>
+        </p:nvCxnSpPr>
+        <p:spPr>
+          <a:xfrm rot="5400000" flipH="1">
+            <a:off x="3468002" y="3607900"/>
+            <a:ext cx="391309" cy="0"/>
+          </a:xfrm>
+          <a:prstGeom prst="line">
+            <a:avLst/>
+          </a:prstGeom>
+          <a:ln w="38100">
+            <a:solidFill>
+              <a:schemeClr val="tx1"/>
+            </a:solidFill>
+          </a:ln>
+        </p:spPr>
+        <p:style>
+          <a:lnRef idx="2">
+            <a:schemeClr val="accent1"/>
+          </a:lnRef>
+          <a:fillRef idx="0">
+            <a:schemeClr val="accent1"/>
+          </a:fillRef>
+          <a:effectRef idx="1">
+            <a:schemeClr val="accent1"/>
+          </a:effectRef>
+          <a:fontRef idx="minor">
+            <a:schemeClr val="tx1"/>
+          </a:fontRef>
+        </p:style>
+      </p:cxnSp>
+      <p:pic>
+        <p:nvPicPr>
+          <p:cNvPr id="14" name="Picture 13">
+            <a:extLst>
+              <a:ext uri="{FF2B5EF4-FFF2-40B4-BE49-F238E27FC236}">
+                <a16:creationId xmlns:a16="http://schemas.microsoft.com/office/drawing/2014/main" id="{E14B1276-08CA-B34D-A304-8684AFF0B901}"/>
+              </a:ext>
+            </a:extLst>
+          </p:cNvPr>
+          <p:cNvPicPr>
+            <a:picLocks noChangeAspect="1"/>
+          </p:cNvPicPr>
+          <p:nvPr/>
+        </p:nvPicPr>
+        <p:blipFill>
+          <a:blip r:embed="rId3"/>
+          <a:stretch>
+            <a:fillRect/>
+          </a:stretch>
+        </p:blipFill>
+        <p:spPr>
+          <a:xfrm>
+            <a:off x="3260034" y="3808986"/>
+            <a:ext cx="914400" cy="914400"/>
+          </a:xfrm>
+          <a:prstGeom prst="rect">
+            <a:avLst/>
+          </a:prstGeom>
+        </p:spPr>
+      </p:pic>
+      <p:cxnSp>
+        <p:nvCxnSpPr>
+          <p:cNvPr id="52" name="Straight Connector 51">
+            <a:extLst>
+              <a:ext uri="{FF2B5EF4-FFF2-40B4-BE49-F238E27FC236}">
+                <a16:creationId xmlns:a16="http://schemas.microsoft.com/office/drawing/2014/main" id="{6CCECEBE-B4A1-BD4F-968F-6C6C2CC29F5D}"/>
+              </a:ext>
+            </a:extLst>
+          </p:cNvPr>
+          <p:cNvCxnSpPr>
+            <a:cxnSpLocks/>
+          </p:cNvCxnSpPr>
+          <p:nvPr/>
+        </p:nvCxnSpPr>
+        <p:spPr>
+          <a:xfrm flipV="1">
+            <a:off x="3663657" y="2755818"/>
+            <a:ext cx="0" cy="514382"/>
+          </a:xfrm>
+          <a:prstGeom prst="line">
+            <a:avLst/>
+          </a:prstGeom>
+          <a:ln w="38100">
+            <a:solidFill>
+              <a:schemeClr val="tx1"/>
+            </a:solidFill>
+          </a:ln>
+        </p:spPr>
+        <p:style>
+          <a:lnRef idx="2">
+            <a:schemeClr val="accent1"/>
+          </a:lnRef>
+          <a:fillRef idx="0">
+            <a:schemeClr val="accent1"/>
+          </a:fillRef>
+          <a:effectRef idx="1">
+            <a:schemeClr val="accent1"/>
+          </a:effectRef>
+          <a:fontRef idx="minor">
+            <a:schemeClr val="tx1"/>
+          </a:fontRef>
+        </p:style>
+      </p:cxnSp>
+      <p:grpSp>
+        <p:nvGrpSpPr>
+          <p:cNvPr id="53" name="Group 52">
+            <a:extLst>
+              <a:ext uri="{FF2B5EF4-FFF2-40B4-BE49-F238E27FC236}">
+                <a16:creationId xmlns:a16="http://schemas.microsoft.com/office/drawing/2014/main" id="{EB0BD39D-8363-F34F-BABE-730E9FECA29C}"/>
+              </a:ext>
+            </a:extLst>
+          </p:cNvPr>
+          <p:cNvGrpSpPr/>
+          <p:nvPr/>
+        </p:nvGrpSpPr>
+        <p:grpSpPr>
+          <a:xfrm rot="16200000">
+            <a:off x="3592836" y="2466048"/>
+            <a:ext cx="141643" cy="457200"/>
+            <a:chOff x="1914861" y="4077148"/>
+            <a:chExt cx="141643" cy="457200"/>
+          </a:xfrm>
+        </p:grpSpPr>
+        <p:cxnSp>
+          <p:nvCxnSpPr>
+            <p:cNvPr id="54" name="Straight Connector 53">
+              <a:extLst>
+                <a:ext uri="{FF2B5EF4-FFF2-40B4-BE49-F238E27FC236}">
+                  <a16:creationId xmlns:a16="http://schemas.microsoft.com/office/drawing/2014/main" id="{34015126-FEF4-9844-BE63-76D40ECD4C25}"/>
+                </a:ext>
+              </a:extLst>
+            </p:cNvPr>
+            <p:cNvCxnSpPr/>
+            <p:nvPr/>
+          </p:nvCxnSpPr>
+          <p:spPr>
+            <a:xfrm>
+              <a:off x="1914861" y="4077148"/>
+              <a:ext cx="0" cy="457200"/>
+            </a:xfrm>
+            <a:prstGeom prst="line">
+              <a:avLst/>
+            </a:prstGeom>
+            <a:ln w="38100">
+              <a:solidFill>
+                <a:schemeClr val="tx1"/>
+              </a:solidFill>
+            </a:ln>
+          </p:spPr>
+          <p:style>
+            <a:lnRef idx="2">
+              <a:schemeClr val="accent1"/>
+            </a:lnRef>
+            <a:fillRef idx="0">
+              <a:schemeClr val="accent1"/>
+            </a:fillRef>
+            <a:effectRef idx="1">
+              <a:schemeClr val="accent1"/>
+            </a:effectRef>
+            <a:fontRef idx="minor">
+              <a:schemeClr val="tx1"/>
+            </a:fontRef>
+          </p:style>
+        </p:cxnSp>
+        <p:cxnSp>
+          <p:nvCxnSpPr>
+            <p:cNvPr id="55" name="Straight Connector 54">
+              <a:extLst>
+                <a:ext uri="{FF2B5EF4-FFF2-40B4-BE49-F238E27FC236}">
+                  <a16:creationId xmlns:a16="http://schemas.microsoft.com/office/drawing/2014/main" id="{AD829D23-79A2-C84B-91A8-EC59EFC10EB3}"/>
+                </a:ext>
+              </a:extLst>
+            </p:cNvPr>
+            <p:cNvCxnSpPr/>
+            <p:nvPr/>
+          </p:nvCxnSpPr>
+          <p:spPr>
+            <a:xfrm>
+              <a:off x="2056504" y="4077148"/>
+              <a:ext cx="0" cy="457200"/>
+            </a:xfrm>
+            <a:prstGeom prst="line">
+              <a:avLst/>
+            </a:prstGeom>
+            <a:ln w="38100">
+              <a:solidFill>
+                <a:schemeClr val="tx1"/>
+              </a:solidFill>
+            </a:ln>
+          </p:spPr>
+          <p:style>
+            <a:lnRef idx="2">
+              <a:schemeClr val="accent1"/>
+            </a:lnRef>
+            <a:fillRef idx="0">
+              <a:schemeClr val="accent1"/>
+            </a:fillRef>
+            <a:effectRef idx="1">
+              <a:schemeClr val="accent1"/>
+            </a:effectRef>
+            <a:fontRef idx="minor">
+              <a:schemeClr val="tx1"/>
+            </a:fontRef>
+          </p:style>
+        </p:cxnSp>
+      </p:grpSp>
+      <p:cxnSp>
+        <p:nvCxnSpPr>
+          <p:cNvPr id="56" name="Straight Connector 55">
+            <a:extLst>
+              <a:ext uri="{FF2B5EF4-FFF2-40B4-BE49-F238E27FC236}">
+                <a16:creationId xmlns:a16="http://schemas.microsoft.com/office/drawing/2014/main" id="{FCB43012-EC88-AF44-8314-368A6B1E68F4}"/>
+              </a:ext>
+            </a:extLst>
+          </p:cNvPr>
+          <p:cNvCxnSpPr>
+            <a:cxnSpLocks/>
+          </p:cNvCxnSpPr>
+          <p:nvPr/>
+        </p:nvCxnSpPr>
+        <p:spPr>
+          <a:xfrm flipV="1">
+            <a:off x="3660748" y="2109444"/>
+            <a:ext cx="0" cy="514382"/>
+          </a:xfrm>
+          <a:prstGeom prst="line">
+            <a:avLst/>
+          </a:prstGeom>
+          <a:ln w="38100">
+            <a:solidFill>
+              <a:schemeClr val="tx1"/>
+            </a:solidFill>
+          </a:ln>
+        </p:spPr>
+        <p:style>
+          <a:lnRef idx="2">
+            <a:schemeClr val="accent1"/>
+          </a:lnRef>
+          <a:fillRef idx="0">
+            <a:schemeClr val="accent1"/>
+          </a:fillRef>
+          <a:effectRef idx="1">
+            <a:schemeClr val="accent1"/>
+          </a:effectRef>
+          <a:fontRef idx="minor">
+            <a:schemeClr val="tx1"/>
+          </a:fontRef>
+        </p:style>
+      </p:cxnSp>
+      <p:pic>
+        <p:nvPicPr>
+          <p:cNvPr id="5" name="Picture 4">
+            <a:extLst>
+              <a:ext uri="{FF2B5EF4-FFF2-40B4-BE49-F238E27FC236}">
+                <a16:creationId xmlns:a16="http://schemas.microsoft.com/office/drawing/2014/main" id="{BA99C0D0-8D05-EE49-A44D-4DA6C8D22EF0}"/>
+              </a:ext>
+            </a:extLst>
+          </p:cNvPr>
+          <p:cNvPicPr>
+            <a:picLocks noChangeAspect="1"/>
+          </p:cNvPicPr>
+          <p:nvPr/>
+        </p:nvPicPr>
+        <p:blipFill>
+          <a:blip r:embed="rId4"/>
+          <a:stretch>
+            <a:fillRect/>
+          </a:stretch>
+        </p:blipFill>
+        <p:spPr>
+          <a:xfrm>
+            <a:off x="3260034" y="1603121"/>
+            <a:ext cx="914400" cy="914400"/>
+          </a:xfrm>
+          <a:prstGeom prst="rect">
+            <a:avLst/>
+          </a:prstGeom>
+        </p:spPr>
+      </p:pic>
+      <p:sp>
+        <p:nvSpPr>
+          <p:cNvPr id="44" name="Rounded Rectangle 43">
+            <a:extLst>
+              <a:ext uri="{FF2B5EF4-FFF2-40B4-BE49-F238E27FC236}">
+                <a16:creationId xmlns:a16="http://schemas.microsoft.com/office/drawing/2014/main" id="{A3FD3292-1B17-3249-9174-DED1B11BC4E1}"/>
+              </a:ext>
+            </a:extLst>
+          </p:cNvPr>
+          <p:cNvSpPr/>
+          <p:nvPr/>
+        </p:nvSpPr>
+        <p:spPr>
+          <a:xfrm>
+            <a:off x="3087444" y="2894231"/>
+            <a:ext cx="1387731" cy="281153"/>
+          </a:xfrm>
+          <a:prstGeom prst="roundRect">
+            <a:avLst>
+              <a:gd name="adj" fmla="val 25291"/>
+            </a:avLst>
+          </a:prstGeom>
+          <a:solidFill>
+            <a:schemeClr val="accent1">
+              <a:lumMod val="40000"/>
+              <a:lumOff val="60000"/>
+            </a:schemeClr>
+          </a:solidFill>
+          <a:ln>
+            <a:noFill/>
+          </a:ln>
+          <a:effectLst/>
+        </p:spPr>
+        <p:style>
+          <a:lnRef idx="1">
+            <a:schemeClr val="accent1"/>
+          </a:lnRef>
+          <a:fillRef idx="3">
+            <a:schemeClr val="accent1"/>
+          </a:fillRef>
+          <a:effectRef idx="2">
+            <a:schemeClr val="accent1"/>
+          </a:effectRef>
+          <a:fontRef idx="minor">
+            <a:schemeClr val="lt1"/>
+          </a:fontRef>
+        </p:style>
+        <p:txBody>
+          <a:bodyPr rtlCol="0" anchor="ctr"/>
+          <a:lstStyle/>
+          <a:p>
+            <a:pPr algn="ctr"/>
+            <a:endParaRPr lang="en-US"/>
+          </a:p>
+        </p:txBody>
+      </p:sp>
+    </p:spTree>
+    <p:extLst>
+      <p:ext uri="{BB962C8B-B14F-4D97-AF65-F5344CB8AC3E}">
+        <p14:creationId xmlns:p14="http://schemas.microsoft.com/office/powerpoint/2010/main" val="853528174"/>
+      </p:ext>
+    </p:extLst>
+  </p:cSld>
+  <p:clrMapOvr>
+    <a:masterClrMapping/>
+  </p:clrMapOvr>
+</p:sld>
+</file>
+
+<file path=ppt/slides/slide22.xml><?xml version="1.0" encoding="utf-8"?>
+<p:sld xmlns:a="http://schemas.openxmlformats.org/drawingml/2006/main" xmlns:r="http://schemas.openxmlformats.org/officeDocument/2006/relationships" xmlns:p="http://schemas.openxmlformats.org/presentationml/2006/main">
+  <p:cSld>
+    <p:spTree>
+      <p:nvGrpSpPr>
+        <p:cNvPr id="1" name=""/>
+        <p:cNvGrpSpPr/>
+        <p:nvPr/>
+      </p:nvGrpSpPr>
+      <p:grpSpPr>
+        <a:xfrm>
+          <a:off x="0" y="0"/>
+          <a:ext cx="0" cy="0"/>
+          <a:chOff x="0" y="0"/>
+          <a:chExt cx="0" cy="0"/>
+        </a:xfrm>
+      </p:grpSpPr>
+      <p:sp>
+        <p:nvSpPr>
+          <p:cNvPr id="2" name="Title 1"/>
+          <p:cNvSpPr>
+            <a:spLocks noGrp="1"/>
+          </p:cNvSpPr>
+          <p:nvPr>
+            <p:ph type="title"/>
+          </p:nvPr>
+        </p:nvSpPr>
+        <p:spPr/>
+        <p:txBody>
+          <a:bodyPr/>
+          <a:lstStyle/>
+          <a:p>
+            <a:r>
+              <a:rPr lang="en-US" dirty="0"/>
+              <a:t>Architecture</a:t>
+            </a:r>
+          </a:p>
+        </p:txBody>
+      </p:sp>
+      <p:sp>
+        <p:nvSpPr>
+          <p:cNvPr id="6" name="Rectangle 5">
+            <a:extLst>
+              <a:ext uri="{FF2B5EF4-FFF2-40B4-BE49-F238E27FC236}">
+                <a16:creationId xmlns:a16="http://schemas.microsoft.com/office/drawing/2014/main" id="{9B7C2029-6098-3747-B46F-AFD8FF1DE869}"/>
+              </a:ext>
+            </a:extLst>
+          </p:cNvPr>
+          <p:cNvSpPr/>
+          <p:nvPr/>
+        </p:nvSpPr>
+        <p:spPr>
+          <a:xfrm>
+            <a:off x="457200" y="1129085"/>
+            <a:ext cx="8657368" cy="1200329"/>
+          </a:xfrm>
+          <a:prstGeom prst="rect">
+            <a:avLst/>
+          </a:prstGeom>
+        </p:spPr>
+        <p:txBody>
+          <a:bodyPr wrap="square">
+            <a:spAutoFit/>
+          </a:bodyPr>
+          <a:lstStyle/>
+          <a:p>
+            <a:r>
+              <a:rPr lang="en-US" sz="3600" dirty="0">
+                <a:latin typeface="PF DIN Text Pro Light" panose="02000506030000020004" pitchFamily="2" charset="0"/>
+              </a:rPr>
+              <a:t>… and with external query sources &amp; uploaders via client </a:t>
+            </a:r>
+            <a:r>
+              <a:rPr lang="en-US" sz="3600" cap="small" dirty="0">
+                <a:latin typeface="PF DIN Text Pro Light" panose="02000506030000020004" pitchFamily="2" charset="0"/>
+              </a:rPr>
+              <a:t>api</a:t>
+            </a:r>
+            <a:r>
+              <a:rPr lang="en-US" sz="3600" dirty="0">
+                <a:latin typeface="PF DIN Text Pro Light" panose="02000506030000020004" pitchFamily="2" charset="0"/>
+              </a:rPr>
+              <a:t>.</a:t>
+            </a:r>
+          </a:p>
+        </p:txBody>
+      </p:sp>
+      <p:sp>
+        <p:nvSpPr>
+          <p:cNvPr id="7" name="Rounded Rectangle 6">
+            <a:extLst>
+              <a:ext uri="{FF2B5EF4-FFF2-40B4-BE49-F238E27FC236}">
+                <a16:creationId xmlns:a16="http://schemas.microsoft.com/office/drawing/2014/main" id="{615C7128-7973-4F42-935C-83118AE00AE5}"/>
+              </a:ext>
+            </a:extLst>
+          </p:cNvPr>
+          <p:cNvSpPr/>
+          <p:nvPr/>
+        </p:nvSpPr>
+        <p:spPr>
+          <a:xfrm>
+            <a:off x="3087445" y="3429000"/>
+            <a:ext cx="1387731" cy="2240280"/>
+          </a:xfrm>
+          <a:prstGeom prst="roundRect">
+            <a:avLst>
+              <a:gd name="adj" fmla="val 4574"/>
+            </a:avLst>
+          </a:prstGeom>
+          <a:solidFill>
+            <a:schemeClr val="bg1">
+              <a:lumMod val="85000"/>
+            </a:schemeClr>
+          </a:solidFill>
+          <a:ln>
+            <a:noFill/>
+          </a:ln>
+          <a:effectLst/>
+        </p:spPr>
+        <p:style>
+          <a:lnRef idx="1">
+            <a:schemeClr val="accent1"/>
+          </a:lnRef>
+          <a:fillRef idx="3">
+            <a:schemeClr val="accent1"/>
+          </a:fillRef>
+          <a:effectRef idx="2">
+            <a:schemeClr val="accent1"/>
+          </a:effectRef>
+          <a:fontRef idx="minor">
+            <a:schemeClr val="lt1"/>
+          </a:fontRef>
+        </p:style>
+        <p:txBody>
+          <a:bodyPr rtlCol="0" anchor="ctr"/>
+          <a:lstStyle/>
+          <a:p>
+            <a:pPr algn="ctr"/>
+            <a:endParaRPr lang="en-US"/>
+          </a:p>
+        </p:txBody>
+      </p:sp>
+      <p:pic>
+        <p:nvPicPr>
+          <p:cNvPr id="14" name="Picture 13">
+            <a:extLst>
+              <a:ext uri="{FF2B5EF4-FFF2-40B4-BE49-F238E27FC236}">
+                <a16:creationId xmlns:a16="http://schemas.microsoft.com/office/drawing/2014/main" id="{E14B1276-08CA-B34D-A304-8684AFF0B901}"/>
+              </a:ext>
+            </a:extLst>
+          </p:cNvPr>
+          <p:cNvPicPr>
+            <a:picLocks noChangeAspect="1"/>
+          </p:cNvPicPr>
+          <p:nvPr/>
+        </p:nvPicPr>
+        <p:blipFill>
+          <a:blip r:embed="rId2"/>
+          <a:stretch>
+            <a:fillRect/>
+          </a:stretch>
+        </p:blipFill>
+        <p:spPr>
+          <a:xfrm>
+            <a:off x="3260034" y="3808986"/>
+            <a:ext cx="914400" cy="914400"/>
+          </a:xfrm>
+          <a:prstGeom prst="rect">
+            <a:avLst/>
+          </a:prstGeom>
+        </p:spPr>
+      </p:pic>
+      <p:grpSp>
+        <p:nvGrpSpPr>
+          <p:cNvPr id="24" name="Group 23">
+            <a:extLst>
+              <a:ext uri="{FF2B5EF4-FFF2-40B4-BE49-F238E27FC236}">
+                <a16:creationId xmlns:a16="http://schemas.microsoft.com/office/drawing/2014/main" id="{433D289D-840C-0A4B-AE49-00B4360BBD7A}"/>
+              </a:ext>
+            </a:extLst>
+          </p:cNvPr>
+          <p:cNvGrpSpPr/>
+          <p:nvPr/>
+        </p:nvGrpSpPr>
+        <p:grpSpPr>
+          <a:xfrm>
+            <a:off x="1267647" y="4023358"/>
+            <a:ext cx="1992388" cy="457200"/>
+            <a:chOff x="1267647" y="4023358"/>
+            <a:chExt cx="1992388" cy="457200"/>
+          </a:xfrm>
+        </p:grpSpPr>
+        <p:grpSp>
+          <p:nvGrpSpPr>
+            <p:cNvPr id="25" name="Group 24">
+              <a:extLst>
+                <a:ext uri="{FF2B5EF4-FFF2-40B4-BE49-F238E27FC236}">
+                  <a16:creationId xmlns:a16="http://schemas.microsoft.com/office/drawing/2014/main" id="{7576A4DF-83EA-8B45-BCD8-05CFFAAAD613}"/>
+                </a:ext>
+              </a:extLst>
+            </p:cNvPr>
+            <p:cNvGrpSpPr/>
+            <p:nvPr/>
+          </p:nvGrpSpPr>
+          <p:grpSpPr>
+            <a:xfrm>
+              <a:off x="1914861" y="4023358"/>
+              <a:ext cx="141643" cy="457200"/>
+              <a:chOff x="1914861" y="4077148"/>
+              <a:chExt cx="141643" cy="457200"/>
+            </a:xfrm>
+          </p:grpSpPr>
+          <p:cxnSp>
+            <p:nvCxnSpPr>
+              <p:cNvPr id="28" name="Straight Connector 27">
+                <a:extLst>
+                  <a:ext uri="{FF2B5EF4-FFF2-40B4-BE49-F238E27FC236}">
+                    <a16:creationId xmlns:a16="http://schemas.microsoft.com/office/drawing/2014/main" id="{3C981C61-1B7E-ED4C-A122-35A785E61895}"/>
+                  </a:ext>
+                </a:extLst>
+              </p:cNvPr>
+              <p:cNvCxnSpPr/>
+              <p:nvPr/>
+            </p:nvCxnSpPr>
+            <p:spPr>
+              <a:xfrm>
+                <a:off x="1914861" y="4077148"/>
+                <a:ext cx="0" cy="457200"/>
+              </a:xfrm>
+              <a:prstGeom prst="line">
+                <a:avLst/>
+              </a:prstGeom>
+              <a:ln w="38100">
+                <a:solidFill>
+                  <a:schemeClr val="tx1"/>
+                </a:solidFill>
+              </a:ln>
+            </p:spPr>
+            <p:style>
+              <a:lnRef idx="2">
+                <a:schemeClr val="accent1"/>
+              </a:lnRef>
+              <a:fillRef idx="0">
+                <a:schemeClr val="accent1"/>
+              </a:fillRef>
+              <a:effectRef idx="1">
+                <a:schemeClr val="accent1"/>
+              </a:effectRef>
+              <a:fontRef idx="minor">
+                <a:schemeClr val="tx1"/>
+              </a:fontRef>
+            </p:style>
+          </p:cxnSp>
+          <p:cxnSp>
+            <p:nvCxnSpPr>
+              <p:cNvPr id="29" name="Straight Connector 28">
+                <a:extLst>
+                  <a:ext uri="{FF2B5EF4-FFF2-40B4-BE49-F238E27FC236}">
+                    <a16:creationId xmlns:a16="http://schemas.microsoft.com/office/drawing/2014/main" id="{D577F261-0274-C04F-97BE-140117DF7602}"/>
+                  </a:ext>
+                </a:extLst>
+              </p:cNvPr>
+              <p:cNvCxnSpPr/>
+              <p:nvPr/>
+            </p:nvCxnSpPr>
+            <p:spPr>
+              <a:xfrm>
+                <a:off x="2056504" y="4077148"/>
+                <a:ext cx="0" cy="457200"/>
+              </a:xfrm>
+              <a:prstGeom prst="line">
+                <a:avLst/>
+              </a:prstGeom>
+              <a:ln w="38100">
+                <a:solidFill>
+                  <a:schemeClr val="tx1"/>
+                </a:solidFill>
+              </a:ln>
+            </p:spPr>
+            <p:style>
+              <a:lnRef idx="2">
+                <a:schemeClr val="accent1"/>
+              </a:lnRef>
+              <a:fillRef idx="0">
+                <a:schemeClr val="accent1"/>
+              </a:fillRef>
+              <a:effectRef idx="1">
+                <a:schemeClr val="accent1"/>
+              </a:effectRef>
+              <a:fontRef idx="minor">
+                <a:schemeClr val="tx1"/>
+              </a:fontRef>
+            </p:style>
+          </p:cxnSp>
+        </p:grpSp>
+        <p:cxnSp>
+          <p:nvCxnSpPr>
+            <p:cNvPr id="26" name="Straight Connector 25">
+              <a:extLst>
+                <a:ext uri="{FF2B5EF4-FFF2-40B4-BE49-F238E27FC236}">
+                  <a16:creationId xmlns:a16="http://schemas.microsoft.com/office/drawing/2014/main" id="{943FF85A-CAAE-6942-ABAA-A15D7BC79F02}"/>
+                </a:ext>
+              </a:extLst>
+            </p:cNvPr>
+            <p:cNvCxnSpPr>
+              <a:cxnSpLocks/>
+            </p:cNvCxnSpPr>
+            <p:nvPr/>
+          </p:nvCxnSpPr>
+          <p:spPr>
+            <a:xfrm flipH="1">
+              <a:off x="2056504" y="4260028"/>
+              <a:ext cx="1203531" cy="0"/>
+            </a:xfrm>
+            <a:prstGeom prst="line">
+              <a:avLst/>
+            </a:prstGeom>
+            <a:ln w="38100">
+              <a:solidFill>
+                <a:schemeClr val="tx1"/>
+              </a:solidFill>
+            </a:ln>
+          </p:spPr>
+          <p:style>
+            <a:lnRef idx="2">
+              <a:schemeClr val="accent1"/>
+            </a:lnRef>
+            <a:fillRef idx="0">
+              <a:schemeClr val="accent1"/>
+            </a:fillRef>
+            <a:effectRef idx="1">
+              <a:schemeClr val="accent1"/>
+            </a:effectRef>
+            <a:fontRef idx="minor">
+              <a:schemeClr val="tx1"/>
+            </a:fontRef>
+          </p:style>
+        </p:cxnSp>
+        <p:cxnSp>
+          <p:nvCxnSpPr>
+            <p:cNvPr id="27" name="Straight Connector 26">
+              <a:extLst>
+                <a:ext uri="{FF2B5EF4-FFF2-40B4-BE49-F238E27FC236}">
+                  <a16:creationId xmlns:a16="http://schemas.microsoft.com/office/drawing/2014/main" id="{0F8CD731-CCED-6642-A1CC-0A99344C2037}"/>
+                </a:ext>
+              </a:extLst>
+            </p:cNvPr>
+            <p:cNvCxnSpPr>
+              <a:cxnSpLocks/>
+            </p:cNvCxnSpPr>
+            <p:nvPr/>
+          </p:nvCxnSpPr>
+          <p:spPr>
+            <a:xfrm flipH="1">
+              <a:off x="1267647" y="4260028"/>
+              <a:ext cx="647216" cy="6158"/>
+            </a:xfrm>
+            <a:prstGeom prst="line">
+              <a:avLst/>
+            </a:prstGeom>
+            <a:ln w="38100">
+              <a:solidFill>
+                <a:schemeClr val="tx1"/>
+              </a:solidFill>
+            </a:ln>
+          </p:spPr>
+          <p:style>
+            <a:lnRef idx="2">
+              <a:schemeClr val="accent1"/>
+            </a:lnRef>
+            <a:fillRef idx="0">
+              <a:schemeClr val="accent1"/>
+            </a:fillRef>
+            <a:effectRef idx="1">
+              <a:schemeClr val="accent1"/>
+            </a:effectRef>
+            <a:fontRef idx="minor">
+              <a:schemeClr val="tx1"/>
+            </a:fontRef>
+          </p:style>
+        </p:cxnSp>
+      </p:grpSp>
+      <p:pic>
+        <p:nvPicPr>
+          <p:cNvPr id="31" name="Picture 30">
+            <a:extLst>
+              <a:ext uri="{FF2B5EF4-FFF2-40B4-BE49-F238E27FC236}">
+                <a16:creationId xmlns:a16="http://schemas.microsoft.com/office/drawing/2014/main" id="{D1831C39-F2B1-B749-862B-96622DD60D75}"/>
+              </a:ext>
+            </a:extLst>
+          </p:cNvPr>
+          <p:cNvPicPr>
+            <a:picLocks noChangeAspect="1"/>
+          </p:cNvPicPr>
+          <p:nvPr/>
+        </p:nvPicPr>
+        <p:blipFill>
+          <a:blip r:embed="rId3"/>
+          <a:stretch>
+            <a:fillRect/>
+          </a:stretch>
+        </p:blipFill>
+        <p:spPr>
+          <a:xfrm>
+            <a:off x="657562" y="3803556"/>
+            <a:ext cx="914400" cy="914400"/>
+          </a:xfrm>
+          <a:prstGeom prst="rect">
+            <a:avLst/>
+          </a:prstGeom>
+        </p:spPr>
+      </p:pic>
+    </p:spTree>
+    <p:extLst>
+      <p:ext uri="{BB962C8B-B14F-4D97-AF65-F5344CB8AC3E}">
+        <p14:creationId xmlns:p14="http://schemas.microsoft.com/office/powerpoint/2010/main" val="2990437553"/>
+      </p:ext>
+    </p:extLst>
+  </p:cSld>
+  <p:clrMapOvr>
+    <a:masterClrMapping/>
+  </p:clrMapOvr>
+</p:sld>
+</file>
+
+<file path=ppt/slides/slide23.xml><?xml version="1.0" encoding="utf-8"?>
+<p:sld xmlns:a="http://schemas.openxmlformats.org/drawingml/2006/main" xmlns:r="http://schemas.openxmlformats.org/officeDocument/2006/relationships" xmlns:p="http://schemas.openxmlformats.org/presentationml/2006/main">
+  <p:cSld>
+    <p:spTree>
+      <p:nvGrpSpPr>
+        <p:cNvPr id="1" name=""/>
+        <p:cNvGrpSpPr/>
+        <p:nvPr/>
+      </p:nvGrpSpPr>
+      <p:grpSpPr>
+        <a:xfrm>
+          <a:off x="0" y="0"/>
+          <a:ext cx="0" cy="0"/>
+          <a:chOff x="0" y="0"/>
+          <a:chExt cx="0" cy="0"/>
+        </a:xfrm>
+      </p:grpSpPr>
+      <p:sp>
+        <p:nvSpPr>
           <p:cNvPr id="57" name="Rounded Rectangle 56">
             <a:extLst>
               <a:ext uri="{FF2B5EF4-FFF2-40B4-BE49-F238E27FC236}">
@@ -12423,7 +13727,7 @@
 </p:sld>
 </file>
 
-<file path=ppt/slides/slide22.xml><?xml version="1.0" encoding="utf-8"?>
+<file path=ppt/slides/slide24.xml><?xml version="1.0" encoding="utf-8"?>
 <p:sld xmlns:a="http://schemas.openxmlformats.org/drawingml/2006/main" xmlns:r="http://schemas.openxmlformats.org/officeDocument/2006/relationships" xmlns:p="http://schemas.openxmlformats.org/presentationml/2006/main">
   <p:cSld>
     <p:spTree>
@@ -12745,7 +14049,7 @@
 </p:sld>
 </file>
 
-<file path=ppt/slides/slide23.xml><?xml version="1.0" encoding="utf-8"?>
+<file path=ppt/slides/slide25.xml><?xml version="1.0" encoding="utf-8"?>
 <p:sld xmlns:a="http://schemas.openxmlformats.org/drawingml/2006/main" xmlns:r="http://schemas.openxmlformats.org/officeDocument/2006/relationships" xmlns:p="http://schemas.openxmlformats.org/presentationml/2006/main">
   <p:cSld>
     <p:spTree>
@@ -12794,14 +14098,14 @@
             <p:ph type="tbl" sz="quarter" idx="10"/>
             <p:extLst>
               <p:ext uri="{D42A27DB-BD31-4B8C-83A1-F6EECF244321}">
-                <p14:modId xmlns:p14="http://schemas.microsoft.com/office/powerpoint/2010/main" val="507568672"/>
+                <p14:modId xmlns:p14="http://schemas.microsoft.com/office/powerpoint/2010/main" val="2180011082"/>
               </p:ext>
             </p:extLst>
           </p:nvPr>
         </p:nvGraphicFramePr>
         <p:xfrm>
           <a:off x="1" y="914400"/>
-          <a:ext cx="9143999" cy="3690747"/>
+          <a:ext cx="9143999" cy="4071747"/>
         </p:xfrm>
         <a:graphic>
           <a:graphicData uri="http://schemas.openxmlformats.org/drawingml/2006/table">
@@ -13041,25 +14345,8 @@
                           <a:latin typeface="PFDinTextPro-Regular"/>
                           <a:cs typeface="PFDinTextPro-Regular"/>
                         </a:rPr>
-                        <a:t>generic lookup for </a:t>
+                        <a:t>generic lookup for non-local content</a:t>
                       </a:r>
-                      <a:r>
-                        <a:rPr lang="en-US" sz="2400" b="0" i="0" baseline="0">
-                          <a:solidFill>
-                            <a:schemeClr val="tx1"/>
-                          </a:solidFill>
-                          <a:latin typeface="PFDinTextPro-Regular"/>
-                          <a:cs typeface="PFDinTextPro-Regular"/>
-                        </a:rPr>
-                        <a:t>non-local content</a:t>
-                      </a:r>
-                      <a:endParaRPr lang="en-US" sz="2400" b="0" i="0" baseline="0" dirty="0">
-                        <a:solidFill>
-                          <a:schemeClr val="tx1"/>
-                        </a:solidFill>
-                        <a:latin typeface="PFDinTextPro-Regular"/>
-                        <a:cs typeface="PFDinTextPro-Regular"/>
-                      </a:endParaRPr>
                     </a:p>
                     <a:p>
                       <a:pPr marL="152400" indent="-152400">
@@ -13269,13 +14556,16 @@
                         <a:buFont typeface="Arial"/>
                         <a:buChar char="•"/>
                       </a:pPr>
-                      <a:endParaRPr lang="en-US" sz="2400" b="0" i="0" baseline="0" dirty="0">
-                        <a:solidFill>
-                          <a:schemeClr val="tx1"/>
-                        </a:solidFill>
-                        <a:latin typeface="PFDinTextPro-Regular"/>
-                        <a:cs typeface="PFDinTextPro-Regular"/>
-                      </a:endParaRPr>
+                      <a:r>
+                        <a:rPr lang="en-US" sz="2400" b="0" i="0" baseline="0" dirty="0">
+                          <a:solidFill>
+                            <a:schemeClr val="tx1"/>
+                          </a:solidFill>
+                          <a:latin typeface="PFDinTextPro-Regular"/>
+                          <a:cs typeface="PFDinTextPro-Regular"/>
+                        </a:rPr>
+                        <a:t>generic interworking with other data sources &amp; query sources</a:t>
+                      </a:r>
                     </a:p>
                   </a:txBody>
                   <a:tcPr marL="50800" marR="50800" marT="50800" marB="50800">
@@ -13325,7 +14615,7 @@
 </p:sld>
 </file>
 
-<file path=ppt/slides/slide24.xml><?xml version="1.0" encoding="utf-8"?>
+<file path=ppt/slides/slide26.xml><?xml version="1.0" encoding="utf-8"?>
 <p:sld xmlns:a="http://schemas.openxmlformats.org/drawingml/2006/main" xmlns:r="http://schemas.openxmlformats.org/officeDocument/2006/relationships" xmlns:p="http://schemas.openxmlformats.org/presentationml/2006/main">
   <p:cSld>
     <p:spTree>
@@ -14237,7 +15527,7 @@
 </p:sld>
 </file>
 
-<file path=ppt/slides/slide25.xml><?xml version="1.0" encoding="utf-8"?>
+<file path=ppt/slides/slide27.xml><?xml version="1.0" encoding="utf-8"?>
 <p:sld xmlns:a="http://schemas.openxmlformats.org/drawingml/2006/main" xmlns:r="http://schemas.openxmlformats.org/officeDocument/2006/relationships" xmlns:p="http://schemas.openxmlformats.org/presentationml/2006/main">
   <p:cSld>
     <p:spTree>
@@ -15292,7 +16582,7 @@
 </p:sld>
 </file>
 
-<file path=ppt/slides/slide26.xml><?xml version="1.0" encoding="utf-8"?>
+<file path=ppt/slides/slide28.xml><?xml version="1.0" encoding="utf-8"?>
 <p:sld xmlns:a="http://schemas.openxmlformats.org/drawingml/2006/main" xmlns:r="http://schemas.openxmlformats.org/officeDocument/2006/relationships" xmlns:p="http://schemas.openxmlformats.org/presentationml/2006/main">
   <p:cSld>
     <p:spTree>
@@ -16037,7 +17327,7 @@
 </file>
 
 <file path=ppt/slides/slide3.xml><?xml version="1.0" encoding="utf-8"?>
-<p:sld xmlns:a="http://schemas.openxmlformats.org/drawingml/2006/main" xmlns:r="http://schemas.openxmlformats.org/officeDocument/2006/relationships" xmlns:p="http://schemas.openxmlformats.org/presentationml/2006/main">
+<p:sld xmlns:a="http://schemas.openxmlformats.org/drawingml/2006/main" xmlns:r="http://schemas.openxmlformats.org/officeDocument/2006/relationships" xmlns:p="http://schemas.openxmlformats.org/presentationml/2006/main" show="0">
   <p:cSld>
     <p:spTree>
       <p:nvGrpSpPr>
@@ -16781,7 +18071,7 @@
 </file>
 
 <file path=ppt/slides/slide4.xml><?xml version="1.0" encoding="utf-8"?>
-<p:sld xmlns:a="http://schemas.openxmlformats.org/drawingml/2006/main" xmlns:r="http://schemas.openxmlformats.org/officeDocument/2006/relationships" xmlns:p="http://schemas.openxmlformats.org/presentationml/2006/main">
+<p:sld xmlns:a="http://schemas.openxmlformats.org/drawingml/2006/main" xmlns:r="http://schemas.openxmlformats.org/officeDocument/2006/relationships" xmlns:p="http://schemas.openxmlformats.org/presentationml/2006/main" show="0">
   <p:cSld>
     <p:spTree>
       <p:nvGrpSpPr>
@@ -17538,7 +18828,7 @@
 </file>
 
 <file path=ppt/slides/slide5.xml><?xml version="1.0" encoding="utf-8"?>
-<p:sld xmlns:a="http://schemas.openxmlformats.org/drawingml/2006/main" xmlns:r="http://schemas.openxmlformats.org/officeDocument/2006/relationships" xmlns:p="http://schemas.openxmlformats.org/presentationml/2006/main">
+<p:sld xmlns:a="http://schemas.openxmlformats.org/drawingml/2006/main" xmlns:r="http://schemas.openxmlformats.org/officeDocument/2006/relationships" xmlns:p="http://schemas.openxmlformats.org/presentationml/2006/main" show="0">
   <p:cSld>
     <p:spTree>
       <p:nvGrpSpPr>
@@ -18410,7 +19700,7 @@
 </file>
 
 <file path=ppt/slides/slide6.xml><?xml version="1.0" encoding="utf-8"?>
-<p:sld xmlns:a="http://schemas.openxmlformats.org/drawingml/2006/main" xmlns:r="http://schemas.openxmlformats.org/officeDocument/2006/relationships" xmlns:p="http://schemas.openxmlformats.org/presentationml/2006/main">
+<p:sld xmlns:a="http://schemas.openxmlformats.org/drawingml/2006/main" xmlns:r="http://schemas.openxmlformats.org/officeDocument/2006/relationships" xmlns:p="http://schemas.openxmlformats.org/presentationml/2006/main" show="0">
   <p:cSld>
     <p:spTree>
       <p:nvGrpSpPr>

</xml_diff>

<commit_message>
add potential payment flow with external data
ref #11
</commit_message>
<xml_diff>
--- a/docs/2019 05 10 presentation/2019 05 10 overview.pptx
+++ b/docs/2019 05 10 presentation/2019 05 10 overview.pptx
@@ -11020,6 +11020,51 @@
           <a:chExt cx="0" cy="0"/>
         </a:xfrm>
       </p:grpSpPr>
+      <p:cxnSp>
+        <p:nvCxnSpPr>
+          <p:cNvPr id="28" name="Straight Connector 27">
+            <a:extLst>
+              <a:ext uri="{FF2B5EF4-FFF2-40B4-BE49-F238E27FC236}">
+                <a16:creationId xmlns:a16="http://schemas.microsoft.com/office/drawing/2014/main" id="{AA748436-F0D0-6E4A-9C76-96B45B17B8BE}"/>
+              </a:ext>
+            </a:extLst>
+          </p:cNvPr>
+          <p:cNvCxnSpPr>
+            <a:cxnSpLocks/>
+          </p:cNvCxnSpPr>
+          <p:nvPr/>
+        </p:nvCxnSpPr>
+        <p:spPr>
+          <a:xfrm flipV="1">
+            <a:off x="4746788" y="2517399"/>
+            <a:ext cx="0" cy="1032625"/>
+          </a:xfrm>
+          <a:prstGeom prst="line">
+            <a:avLst/>
+          </a:prstGeom>
+          <a:ln w="38100">
+            <a:solidFill>
+              <a:schemeClr val="tx1"/>
+            </a:solidFill>
+            <a:headEnd type="triangle" w="lg" len="lg"/>
+            <a:tailEnd type="triangle" w="lg" len="lg"/>
+          </a:ln>
+        </p:spPr>
+        <p:style>
+          <a:lnRef idx="2">
+            <a:schemeClr val="accent1"/>
+          </a:lnRef>
+          <a:fillRef idx="0">
+            <a:schemeClr val="accent1"/>
+          </a:fillRef>
+          <a:effectRef idx="1">
+            <a:schemeClr val="accent1"/>
+          </a:effectRef>
+          <a:fontRef idx="minor">
+            <a:schemeClr val="tx1"/>
+          </a:fontRef>
+        </p:style>
+      </p:cxnSp>
       <p:sp>
         <p:nvSpPr>
           <p:cNvPr id="2" name="Title 1"/>
@@ -11843,6 +11888,45 @@
           <a:p>
             <a:pPr algn="ctr"/>
             <a:endParaRPr lang="en-US"/>
+          </a:p>
+        </p:txBody>
+      </p:sp>
+      <p:sp>
+        <p:nvSpPr>
+          <p:cNvPr id="9" name="Rectangle 8">
+            <a:extLst>
+              <a:ext uri="{FF2B5EF4-FFF2-40B4-BE49-F238E27FC236}">
+                <a16:creationId xmlns:a16="http://schemas.microsoft.com/office/drawing/2014/main" id="{0B3A9089-6D06-9143-ACA8-E44A3FFE842B}"/>
+              </a:ext>
+            </a:extLst>
+          </p:cNvPr>
+          <p:cNvSpPr/>
+          <p:nvPr/>
+        </p:nvSpPr>
+        <p:spPr>
+          <a:xfrm>
+            <a:off x="4525722" y="2850141"/>
+            <a:ext cx="457191" cy="369332"/>
+          </a:xfrm>
+          <a:prstGeom prst="rect">
+            <a:avLst/>
+          </a:prstGeom>
+          <a:solidFill>
+            <a:schemeClr val="bg1"/>
+          </a:solidFill>
+        </p:spPr>
+        <p:txBody>
+          <a:bodyPr wrap="square">
+            <a:spAutoFit/>
+          </a:bodyPr>
+          <a:lstStyle/>
+          <a:p>
+            <a:r>
+              <a:rPr lang="en-US" dirty="0">
+                <a:latin typeface="PF DIN Text Pro Medium" panose="02000506020000020004" pitchFamily="2" charset="0"/>
+              </a:rPr>
+              <a:t>($)</a:t>
+            </a:r>
           </a:p>
         </p:txBody>
       </p:sp>

</xml_diff>

<commit_message>
add location of initially-deployed RAIDAR repos
ref #11
</commit_message>
<xml_diff>
--- a/docs/2019 05 10 presentation/2019 05 10 overview.pptx
+++ b/docs/2019 05 10 presentation/2019 05 10 overview.pptx
@@ -14748,7 +14748,7 @@
             <p:ph type="tbl" sz="quarter" idx="10"/>
             <p:extLst>
               <p:ext uri="{D42A27DB-BD31-4B8C-83A1-F6EECF244321}">
-                <p14:modId xmlns:p14="http://schemas.microsoft.com/office/powerpoint/2010/main" val="1026043994"/>
+                <p14:modId xmlns:p14="http://schemas.microsoft.com/office/powerpoint/2010/main" val="142052345"/>
               </p:ext>
             </p:extLst>
           </p:nvPr>
@@ -14889,7 +14889,56 @@
                           <a:latin typeface="PFDinTextPro-Regular"/>
                           <a:cs typeface="PFDinTextPro-Regular"/>
                         </a:rPr>
-                        <a:t>3-4 repo instances: not fully connected, partially-overlapped data</a:t>
+                        <a:t>3+ repo instances (initially at Berklee, </a:t>
+                      </a:r>
+                      <a:r>
+                        <a:rPr lang="en-US" sz="2400" b="0" i="0" cap="small" baseline="0" dirty="0" err="1">
+                          <a:solidFill>
+                            <a:schemeClr val="tx1"/>
+                          </a:solidFill>
+                          <a:latin typeface="PFDinTextPro-Regular"/>
+                          <a:cs typeface="PFDinTextPro-Regular"/>
+                        </a:rPr>
+                        <a:t>mit</a:t>
+                      </a:r>
+                      <a:r>
+                        <a:rPr lang="en-US" sz="2400" b="0" i="0" baseline="0">
+                          <a:solidFill>
+                            <a:schemeClr val="tx1"/>
+                          </a:solidFill>
+                          <a:latin typeface="PFDinTextPro-Regular"/>
+                          <a:cs typeface="PFDinTextPro-Regular"/>
+                        </a:rPr>
+                        <a:t>):</a:t>
+                      </a:r>
+                      <a:br>
+                        <a:rPr lang="en-US" sz="2400" b="0" i="0" baseline="0">
+                          <a:solidFill>
+                            <a:schemeClr val="tx1"/>
+                          </a:solidFill>
+                          <a:latin typeface="PFDinTextPro-Regular"/>
+                          <a:cs typeface="PFDinTextPro-Regular"/>
+                        </a:rPr>
+                      </a:br>
+                      <a:r>
+                        <a:rPr lang="en-US" sz="2400" b="0" i="0" baseline="0">
+                          <a:solidFill>
+                            <a:schemeClr val="tx1"/>
+                          </a:solidFill>
+                          <a:latin typeface="PFDinTextPro-Regular"/>
+                          <a:cs typeface="PFDinTextPro-Regular"/>
+                        </a:rPr>
+                        <a:t>not </a:t>
+                      </a:r>
+                      <a:r>
+                        <a:rPr lang="en-US" sz="2400" b="0" i="0" baseline="0" dirty="0">
+                          <a:solidFill>
+                            <a:schemeClr val="tx1"/>
+                          </a:solidFill>
+                          <a:latin typeface="PFDinTextPro-Regular"/>
+                          <a:cs typeface="PFDinTextPro-Regular"/>
+                        </a:rPr>
+                        <a:t>fully connected, partially-overlapped data</a:t>
                       </a:r>
                     </a:p>
                     <a:p>

</xml_diff>